<commit_message>
Scrum abgeschlossen und Kanban angefangen
</commit_message>
<xml_diff>
--- a/02_Dokumente/Abbildungen.pptx
+++ b/02_Dokumente/Abbildungen.pptx
@@ -260,7 +260,7 @@
           <a:p>
             <a:fld id="{F632B701-8F95-42D8-B1CD-6F179E4D5FC7}" type="datetimeFigureOut">
               <a:rPr lang="de-DE" smtClean="0"/>
-              <a:t>04.04.2019</a:t>
+              <a:t>09.04.2019</a:t>
             </a:fld>
             <a:endParaRPr lang="de-DE"/>
           </a:p>
@@ -458,7 +458,7 @@
           <a:p>
             <a:fld id="{F632B701-8F95-42D8-B1CD-6F179E4D5FC7}" type="datetimeFigureOut">
               <a:rPr lang="de-DE" smtClean="0"/>
-              <a:t>04.04.2019</a:t>
+              <a:t>09.04.2019</a:t>
             </a:fld>
             <a:endParaRPr lang="de-DE"/>
           </a:p>
@@ -666,7 +666,7 @@
           <a:p>
             <a:fld id="{F632B701-8F95-42D8-B1CD-6F179E4D5FC7}" type="datetimeFigureOut">
               <a:rPr lang="de-DE" smtClean="0"/>
-              <a:t>04.04.2019</a:t>
+              <a:t>09.04.2019</a:t>
             </a:fld>
             <a:endParaRPr lang="de-DE"/>
           </a:p>
@@ -864,7 +864,7 @@
           <a:p>
             <a:fld id="{F632B701-8F95-42D8-B1CD-6F179E4D5FC7}" type="datetimeFigureOut">
               <a:rPr lang="de-DE" smtClean="0"/>
-              <a:t>04.04.2019</a:t>
+              <a:t>09.04.2019</a:t>
             </a:fld>
             <a:endParaRPr lang="de-DE"/>
           </a:p>
@@ -1139,7 +1139,7 @@
           <a:p>
             <a:fld id="{F632B701-8F95-42D8-B1CD-6F179E4D5FC7}" type="datetimeFigureOut">
               <a:rPr lang="de-DE" smtClean="0"/>
-              <a:t>04.04.2019</a:t>
+              <a:t>09.04.2019</a:t>
             </a:fld>
             <a:endParaRPr lang="de-DE"/>
           </a:p>
@@ -1404,7 +1404,7 @@
           <a:p>
             <a:fld id="{F632B701-8F95-42D8-B1CD-6F179E4D5FC7}" type="datetimeFigureOut">
               <a:rPr lang="de-DE" smtClean="0"/>
-              <a:t>04.04.2019</a:t>
+              <a:t>09.04.2019</a:t>
             </a:fld>
             <a:endParaRPr lang="de-DE"/>
           </a:p>
@@ -1816,7 +1816,7 @@
           <a:p>
             <a:fld id="{F632B701-8F95-42D8-B1CD-6F179E4D5FC7}" type="datetimeFigureOut">
               <a:rPr lang="de-DE" smtClean="0"/>
-              <a:t>04.04.2019</a:t>
+              <a:t>09.04.2019</a:t>
             </a:fld>
             <a:endParaRPr lang="de-DE"/>
           </a:p>
@@ -1957,7 +1957,7 @@
           <a:p>
             <a:fld id="{F632B701-8F95-42D8-B1CD-6F179E4D5FC7}" type="datetimeFigureOut">
               <a:rPr lang="de-DE" smtClean="0"/>
-              <a:t>04.04.2019</a:t>
+              <a:t>09.04.2019</a:t>
             </a:fld>
             <a:endParaRPr lang="de-DE"/>
           </a:p>
@@ -2070,7 +2070,7 @@
           <a:p>
             <a:fld id="{F632B701-8F95-42D8-B1CD-6F179E4D5FC7}" type="datetimeFigureOut">
               <a:rPr lang="de-DE" smtClean="0"/>
-              <a:t>04.04.2019</a:t>
+              <a:t>09.04.2019</a:t>
             </a:fld>
             <a:endParaRPr lang="de-DE"/>
           </a:p>
@@ -2381,7 +2381,7 @@
           <a:p>
             <a:fld id="{F632B701-8F95-42D8-B1CD-6F179E4D5FC7}" type="datetimeFigureOut">
               <a:rPr lang="de-DE" smtClean="0"/>
-              <a:t>04.04.2019</a:t>
+              <a:t>09.04.2019</a:t>
             </a:fld>
             <a:endParaRPr lang="de-DE"/>
           </a:p>
@@ -2669,7 +2669,7 @@
           <a:p>
             <a:fld id="{F632B701-8F95-42D8-B1CD-6F179E4D5FC7}" type="datetimeFigureOut">
               <a:rPr lang="de-DE" smtClean="0"/>
-              <a:t>04.04.2019</a:t>
+              <a:t>09.04.2019</a:t>
             </a:fld>
             <a:endParaRPr lang="de-DE"/>
           </a:p>
@@ -2910,7 +2910,7 @@
           <a:p>
             <a:fld id="{F632B701-8F95-42D8-B1CD-6F179E4D5FC7}" type="datetimeFigureOut">
               <a:rPr lang="de-DE" smtClean="0"/>
-              <a:t>04.04.2019</a:t>
+              <a:t>09.04.2019</a:t>
             </a:fld>
             <a:endParaRPr lang="de-DE"/>
           </a:p>
@@ -4031,171 +4031,12 @@
           <a:chExt cx="0" cy="0"/>
         </a:xfrm>
       </p:grpSpPr>
-      <p:sp>
-        <p:nvSpPr>
-          <p:cNvPr id="42" name="Ellipse 41">
+      <p:grpSp>
+        <p:nvGrpSpPr>
+          <p:cNvPr id="93" name="Gruppieren 92">
             <a:extLst>
               <a:ext uri="{FF2B5EF4-FFF2-40B4-BE49-F238E27FC236}">
-                <a16:creationId xmlns:a16="http://schemas.microsoft.com/office/drawing/2014/main" id="{49CF15B1-3251-487A-858D-2ADAEAA1E346}"/>
-              </a:ext>
-            </a:extLst>
-          </p:cNvPr>
-          <p:cNvSpPr/>
-          <p:nvPr/>
-        </p:nvSpPr>
-        <p:spPr>
-          <a:xfrm>
-            <a:off x="6878320" y="1929091"/>
-            <a:ext cx="531495" cy="445770"/>
-          </a:xfrm>
-          <a:prstGeom prst="ellipse">
-            <a:avLst/>
-          </a:prstGeom>
-          <a:solidFill>
-            <a:schemeClr val="tx2">
-              <a:lumMod val="60000"/>
-              <a:lumOff val="40000"/>
-            </a:schemeClr>
-          </a:solidFill>
-        </p:spPr>
-        <p:style>
-          <a:lnRef idx="2">
-            <a:schemeClr val="accent1">
-              <a:shade val="50000"/>
-            </a:schemeClr>
-          </a:lnRef>
-          <a:fillRef idx="1">
-            <a:schemeClr val="accent1"/>
-          </a:fillRef>
-          <a:effectRef idx="0">
-            <a:schemeClr val="accent1"/>
-          </a:effectRef>
-          <a:fontRef idx="minor">
-            <a:schemeClr val="lt1"/>
-          </a:fontRef>
-        </p:style>
-        <p:txBody>
-          <a:bodyPr rtlCol="0" anchor="ctr"/>
-          <a:lstStyle/>
-          <a:p>
-            <a:pPr algn="ctr"/>
-            <a:endParaRPr lang="de-DE"/>
-          </a:p>
-        </p:txBody>
-      </p:sp>
-      <p:sp>
-        <p:nvSpPr>
-          <p:cNvPr id="40" name="Rechteck 39">
-            <a:extLst>
-              <a:ext uri="{FF2B5EF4-FFF2-40B4-BE49-F238E27FC236}">
-                <a16:creationId xmlns:a16="http://schemas.microsoft.com/office/drawing/2014/main" id="{38EA6EE8-D998-4B31-8F1B-121FCF23E7AC}"/>
-              </a:ext>
-            </a:extLst>
-          </p:cNvPr>
-          <p:cNvSpPr/>
-          <p:nvPr/>
-        </p:nvSpPr>
-        <p:spPr>
-          <a:xfrm>
-            <a:off x="5197225" y="3227174"/>
-            <a:ext cx="1263931" cy="394916"/>
-          </a:xfrm>
-          <a:prstGeom prst="rect">
-            <a:avLst/>
-          </a:prstGeom>
-          <a:solidFill>
-            <a:schemeClr val="tx2">
-              <a:lumMod val="60000"/>
-              <a:lumOff val="40000"/>
-            </a:schemeClr>
-          </a:solidFill>
-        </p:spPr>
-        <p:style>
-          <a:lnRef idx="2">
-            <a:schemeClr val="accent1">
-              <a:shade val="50000"/>
-            </a:schemeClr>
-          </a:lnRef>
-          <a:fillRef idx="1">
-            <a:schemeClr val="accent1"/>
-          </a:fillRef>
-          <a:effectRef idx="0">
-            <a:schemeClr val="accent1"/>
-          </a:effectRef>
-          <a:fontRef idx="minor">
-            <a:schemeClr val="lt1"/>
-          </a:fontRef>
-        </p:style>
-        <p:txBody>
-          <a:bodyPr rtlCol="0" anchor="ctr"/>
-          <a:lstStyle/>
-          <a:p>
-            <a:pPr algn="ctr"/>
-            <a:endParaRPr lang="de-DE"/>
-          </a:p>
-        </p:txBody>
-      </p:sp>
-      <p:sp>
-        <p:nvSpPr>
-          <p:cNvPr id="4" name="Denkblase: wolkenförmig 3">
-            <a:extLst>
-              <a:ext uri="{FF2B5EF4-FFF2-40B4-BE49-F238E27FC236}">
-                <a16:creationId xmlns:a16="http://schemas.microsoft.com/office/drawing/2014/main" id="{3C4330E0-21C5-400A-A34A-83212837218D}"/>
-              </a:ext>
-            </a:extLst>
-          </p:cNvPr>
-          <p:cNvSpPr/>
-          <p:nvPr/>
-        </p:nvSpPr>
-        <p:spPr>
-          <a:xfrm>
-            <a:off x="346229" y="2263806"/>
-            <a:ext cx="1305017" cy="896644"/>
-          </a:xfrm>
-          <a:prstGeom prst="cloudCallout">
-            <a:avLst/>
-          </a:prstGeom>
-          <a:solidFill>
-            <a:schemeClr val="tx2">
-              <a:lumMod val="60000"/>
-              <a:lumOff val="40000"/>
-            </a:schemeClr>
-          </a:solidFill>
-        </p:spPr>
-        <p:style>
-          <a:lnRef idx="2">
-            <a:schemeClr val="accent1">
-              <a:shade val="50000"/>
-            </a:schemeClr>
-          </a:lnRef>
-          <a:fillRef idx="1">
-            <a:schemeClr val="accent1"/>
-          </a:fillRef>
-          <a:effectRef idx="0">
-            <a:schemeClr val="accent1"/>
-          </a:effectRef>
-          <a:fontRef idx="minor">
-            <a:schemeClr val="lt1"/>
-          </a:fontRef>
-        </p:style>
-        <p:txBody>
-          <a:bodyPr rtlCol="0" anchor="ctr"/>
-          <a:lstStyle/>
-          <a:p>
-            <a:pPr algn="ctr"/>
-            <a:r>
-              <a:rPr lang="de-DE" dirty="0"/>
-              <a:t>Vision</a:t>
-            </a:r>
-          </a:p>
-        </p:txBody>
-      </p:sp>
-      <p:grpSp>
-        <p:nvGrpSpPr>
-          <p:cNvPr id="11" name="Gruppieren 10">
-            <a:extLst>
-              <a:ext uri="{FF2B5EF4-FFF2-40B4-BE49-F238E27FC236}">
-                <a16:creationId xmlns:a16="http://schemas.microsoft.com/office/drawing/2014/main" id="{6471B517-90E2-4D88-944F-E815D0BCAC92}"/>
+                <a16:creationId xmlns:a16="http://schemas.microsoft.com/office/drawing/2014/main" id="{E7E12EA3-0EF1-4D69-BB93-185B2D86D785}"/>
               </a:ext>
             </a:extLst>
           </p:cNvPr>
@@ -4204,18 +4045,18 @@
         </p:nvGrpSpPr>
         <p:grpSpPr>
           <a:xfrm>
-            <a:off x="2032987" y="1984159"/>
-            <a:ext cx="905522" cy="1779233"/>
-            <a:chOff x="2032987" y="1984159"/>
-            <a:chExt cx="905522" cy="1779233"/>
+            <a:off x="1910086" y="844275"/>
+            <a:ext cx="8296174" cy="4352563"/>
+            <a:chOff x="1910086" y="844275"/>
+            <a:chExt cx="8296174" cy="4352563"/>
           </a:xfrm>
         </p:grpSpPr>
         <p:grpSp>
           <p:nvGrpSpPr>
-            <p:cNvPr id="7" name="Gruppieren 6">
+            <p:cNvPr id="11" name="Gruppieren 10">
               <a:extLst>
                 <a:ext uri="{FF2B5EF4-FFF2-40B4-BE49-F238E27FC236}">
-                  <a16:creationId xmlns:a16="http://schemas.microsoft.com/office/drawing/2014/main" id="{C0190C13-0274-4646-8344-3D62A3A111F6}"/>
+                  <a16:creationId xmlns:a16="http://schemas.microsoft.com/office/drawing/2014/main" id="{6471B517-90E2-4D88-944F-E815D0BCAC92}"/>
                 </a:ext>
               </a:extLst>
             </p:cNvPr>
@@ -4224,18 +4065,438 @@
           </p:nvGrpSpPr>
           <p:grpSpPr>
             <a:xfrm>
-              <a:off x="2032987" y="1984159"/>
-              <a:ext cx="905522" cy="960269"/>
+              <a:off x="2648937" y="844275"/>
+              <a:ext cx="683366" cy="849801"/>
               <a:chOff x="2032987" y="1984159"/>
-              <a:chExt cx="905522" cy="960269"/>
+              <a:chExt cx="905522" cy="1779233"/>
+            </a:xfrm>
+          </p:grpSpPr>
+          <p:grpSp>
+            <p:nvGrpSpPr>
+              <p:cNvPr id="7" name="Gruppieren 6">
+                <a:extLst>
+                  <a:ext uri="{FF2B5EF4-FFF2-40B4-BE49-F238E27FC236}">
+                    <a16:creationId xmlns:a16="http://schemas.microsoft.com/office/drawing/2014/main" id="{C0190C13-0274-4646-8344-3D62A3A111F6}"/>
+                  </a:ext>
+                </a:extLst>
+              </p:cNvPr>
+              <p:cNvGrpSpPr/>
+              <p:nvPr/>
+            </p:nvGrpSpPr>
+            <p:grpSpPr>
+              <a:xfrm>
+                <a:off x="2032987" y="1984159"/>
+                <a:ext cx="905522" cy="960269"/>
+                <a:chOff x="2032987" y="1984159"/>
+                <a:chExt cx="905522" cy="960269"/>
+              </a:xfrm>
+            </p:grpSpPr>
+            <p:sp>
+              <p:nvSpPr>
+                <p:cNvPr id="5" name="Gleich 4">
+                  <a:extLst>
+                    <a:ext uri="{FF2B5EF4-FFF2-40B4-BE49-F238E27FC236}">
+                      <a16:creationId xmlns:a16="http://schemas.microsoft.com/office/drawing/2014/main" id="{B985FAB8-D2DC-4AD9-AFD6-DC35B940B75A}"/>
+                    </a:ext>
+                  </a:extLst>
+                </p:cNvPr>
+                <p:cNvSpPr/>
+                <p:nvPr/>
+              </p:nvSpPr>
+              <p:spPr>
+                <a:xfrm>
+                  <a:off x="2032987" y="1984159"/>
+                  <a:ext cx="905522" cy="559293"/>
+                </a:xfrm>
+                <a:prstGeom prst="mathEqual">
+                  <a:avLst/>
+                </a:prstGeom>
+                <a:solidFill>
+                  <a:schemeClr val="tx2">
+                    <a:lumMod val="60000"/>
+                    <a:lumOff val="40000"/>
+                  </a:schemeClr>
+                </a:solidFill>
+              </p:spPr>
+              <p:style>
+                <a:lnRef idx="2">
+                  <a:schemeClr val="accent1">
+                    <a:shade val="50000"/>
+                  </a:schemeClr>
+                </a:lnRef>
+                <a:fillRef idx="1">
+                  <a:schemeClr val="accent1"/>
+                </a:fillRef>
+                <a:effectRef idx="0">
+                  <a:schemeClr val="accent1"/>
+                </a:effectRef>
+                <a:fontRef idx="minor">
+                  <a:schemeClr val="lt1"/>
+                </a:fontRef>
+              </p:style>
+              <p:txBody>
+                <a:bodyPr rtlCol="0" anchor="ctr"/>
+                <a:lstStyle/>
+                <a:p>
+                  <a:pPr algn="ctr"/>
+                  <a:endParaRPr lang="de-DE">
+                    <a:solidFill>
+                      <a:schemeClr val="tx1"/>
+                    </a:solidFill>
+                  </a:endParaRPr>
+                </a:p>
+              </p:txBody>
+            </p:sp>
+            <p:sp>
+              <p:nvSpPr>
+                <p:cNvPr id="6" name="Gleich 5">
+                  <a:extLst>
+                    <a:ext uri="{FF2B5EF4-FFF2-40B4-BE49-F238E27FC236}">
+                      <a16:creationId xmlns:a16="http://schemas.microsoft.com/office/drawing/2014/main" id="{17C78BC5-5490-41DD-958D-78FFB8EE1552}"/>
+                    </a:ext>
+                  </a:extLst>
+                </p:cNvPr>
+                <p:cNvSpPr/>
+                <p:nvPr/>
+              </p:nvSpPr>
+              <p:spPr>
+                <a:xfrm>
+                  <a:off x="2032987" y="2385135"/>
+                  <a:ext cx="905522" cy="559293"/>
+                </a:xfrm>
+                <a:prstGeom prst="mathEqual">
+                  <a:avLst/>
+                </a:prstGeom>
+                <a:solidFill>
+                  <a:schemeClr val="tx2">
+                    <a:lumMod val="60000"/>
+                    <a:lumOff val="40000"/>
+                  </a:schemeClr>
+                </a:solidFill>
+              </p:spPr>
+              <p:style>
+                <a:lnRef idx="2">
+                  <a:schemeClr val="accent1">
+                    <a:shade val="50000"/>
+                  </a:schemeClr>
+                </a:lnRef>
+                <a:fillRef idx="1">
+                  <a:schemeClr val="accent1"/>
+                </a:fillRef>
+                <a:effectRef idx="0">
+                  <a:schemeClr val="accent1"/>
+                </a:effectRef>
+                <a:fontRef idx="minor">
+                  <a:schemeClr val="lt1"/>
+                </a:fontRef>
+              </p:style>
+              <p:txBody>
+                <a:bodyPr rtlCol="0" anchor="ctr"/>
+                <a:lstStyle/>
+                <a:p>
+                  <a:pPr algn="ctr"/>
+                  <a:endParaRPr lang="de-DE" dirty="0">
+                    <a:solidFill>
+                      <a:schemeClr val="tx1"/>
+                    </a:solidFill>
+                  </a:endParaRPr>
+                </a:p>
+              </p:txBody>
+            </p:sp>
+          </p:grpSp>
+          <p:grpSp>
+            <p:nvGrpSpPr>
+              <p:cNvPr id="8" name="Gruppieren 7">
+                <a:extLst>
+                  <a:ext uri="{FF2B5EF4-FFF2-40B4-BE49-F238E27FC236}">
+                    <a16:creationId xmlns:a16="http://schemas.microsoft.com/office/drawing/2014/main" id="{B63045AA-B569-4C9A-8F72-8D37572AEFE1}"/>
+                  </a:ext>
+                </a:extLst>
+              </p:cNvPr>
+              <p:cNvGrpSpPr/>
+              <p:nvPr/>
+            </p:nvGrpSpPr>
+            <p:grpSpPr>
+              <a:xfrm>
+                <a:off x="2032987" y="2803123"/>
+                <a:ext cx="905522" cy="960269"/>
+                <a:chOff x="2032987" y="1984159"/>
+                <a:chExt cx="905522" cy="960269"/>
+              </a:xfrm>
+            </p:grpSpPr>
+            <p:sp>
+              <p:nvSpPr>
+                <p:cNvPr id="9" name="Gleich 8">
+                  <a:extLst>
+                    <a:ext uri="{FF2B5EF4-FFF2-40B4-BE49-F238E27FC236}">
+                      <a16:creationId xmlns:a16="http://schemas.microsoft.com/office/drawing/2014/main" id="{E9AD7222-FFDC-4BCF-9F5B-CE89218474E2}"/>
+                    </a:ext>
+                  </a:extLst>
+                </p:cNvPr>
+                <p:cNvSpPr/>
+                <p:nvPr/>
+              </p:nvSpPr>
+              <p:spPr>
+                <a:xfrm>
+                  <a:off x="2032987" y="1984159"/>
+                  <a:ext cx="905522" cy="559293"/>
+                </a:xfrm>
+                <a:prstGeom prst="mathEqual">
+                  <a:avLst/>
+                </a:prstGeom>
+                <a:solidFill>
+                  <a:schemeClr val="tx2">
+                    <a:lumMod val="60000"/>
+                    <a:lumOff val="40000"/>
+                  </a:schemeClr>
+                </a:solidFill>
+              </p:spPr>
+              <p:style>
+                <a:lnRef idx="2">
+                  <a:schemeClr val="accent1">
+                    <a:shade val="50000"/>
+                  </a:schemeClr>
+                </a:lnRef>
+                <a:fillRef idx="1">
+                  <a:schemeClr val="accent1"/>
+                </a:fillRef>
+                <a:effectRef idx="0">
+                  <a:schemeClr val="accent1"/>
+                </a:effectRef>
+                <a:fontRef idx="minor">
+                  <a:schemeClr val="lt1"/>
+                </a:fontRef>
+              </p:style>
+              <p:txBody>
+                <a:bodyPr rtlCol="0" anchor="ctr"/>
+                <a:lstStyle/>
+                <a:p>
+                  <a:pPr algn="ctr"/>
+                  <a:endParaRPr lang="de-DE">
+                    <a:solidFill>
+                      <a:schemeClr val="tx1"/>
+                    </a:solidFill>
+                  </a:endParaRPr>
+                </a:p>
+              </p:txBody>
+            </p:sp>
+            <p:sp>
+              <p:nvSpPr>
+                <p:cNvPr id="10" name="Gleich 9">
+                  <a:extLst>
+                    <a:ext uri="{FF2B5EF4-FFF2-40B4-BE49-F238E27FC236}">
+                      <a16:creationId xmlns:a16="http://schemas.microsoft.com/office/drawing/2014/main" id="{02A29B78-C8B4-4471-9955-274D551DC026}"/>
+                    </a:ext>
+                  </a:extLst>
+                </p:cNvPr>
+                <p:cNvSpPr/>
+                <p:nvPr/>
+              </p:nvSpPr>
+              <p:spPr>
+                <a:xfrm>
+                  <a:off x="2032987" y="2385135"/>
+                  <a:ext cx="905522" cy="559293"/>
+                </a:xfrm>
+                <a:prstGeom prst="mathEqual">
+                  <a:avLst/>
+                </a:prstGeom>
+                <a:solidFill>
+                  <a:schemeClr val="tx2">
+                    <a:lumMod val="60000"/>
+                    <a:lumOff val="40000"/>
+                  </a:schemeClr>
+                </a:solidFill>
+              </p:spPr>
+              <p:style>
+                <a:lnRef idx="2">
+                  <a:schemeClr val="accent1">
+                    <a:shade val="50000"/>
+                  </a:schemeClr>
+                </a:lnRef>
+                <a:fillRef idx="1">
+                  <a:schemeClr val="accent1"/>
+                </a:fillRef>
+                <a:effectRef idx="0">
+                  <a:schemeClr val="accent1"/>
+                </a:effectRef>
+                <a:fontRef idx="minor">
+                  <a:schemeClr val="lt1"/>
+                </a:fontRef>
+              </p:style>
+              <p:txBody>
+                <a:bodyPr rtlCol="0" anchor="ctr"/>
+                <a:lstStyle/>
+                <a:p>
+                  <a:pPr algn="ctr"/>
+                  <a:endParaRPr lang="de-DE">
+                    <a:solidFill>
+                      <a:schemeClr val="tx1"/>
+                    </a:solidFill>
+                  </a:endParaRPr>
+                </a:p>
+              </p:txBody>
+            </p:sp>
+          </p:grpSp>
+        </p:grpSp>
+        <p:sp>
+          <p:nvSpPr>
+            <p:cNvPr id="12" name="Textfeld 11">
+              <a:extLst>
+                <a:ext uri="{FF2B5EF4-FFF2-40B4-BE49-F238E27FC236}">
+                  <a16:creationId xmlns:a16="http://schemas.microsoft.com/office/drawing/2014/main" id="{8FB01143-E2A9-4CF2-A145-4BA537E181B6}"/>
+                </a:ext>
+              </a:extLst>
+            </p:cNvPr>
+            <p:cNvSpPr txBox="1"/>
+            <p:nvPr/>
+          </p:nvSpPr>
+          <p:spPr>
+            <a:xfrm>
+              <a:off x="1910086" y="981823"/>
+              <a:ext cx="759025" cy="523220"/>
+            </a:xfrm>
+            <a:prstGeom prst="rect">
+              <a:avLst/>
+            </a:prstGeom>
+            <a:noFill/>
+          </p:spPr>
+          <p:txBody>
+            <a:bodyPr wrap="square" rtlCol="0">
+              <a:spAutoFit/>
+            </a:bodyPr>
+            <a:lstStyle/>
+            <a:p>
+              <a:r>
+                <a:rPr lang="de-DE" sz="1400" dirty="0" err="1"/>
+                <a:t>Product</a:t>
+              </a:r>
+              <a:endParaRPr lang="de-DE" sz="1400" dirty="0"/>
+            </a:p>
+            <a:p>
+              <a:r>
+                <a:rPr lang="de-DE" sz="1400" dirty="0"/>
+                <a:t>Backlog</a:t>
+              </a:r>
+            </a:p>
+          </p:txBody>
+        </p:sp>
+        <p:sp>
+          <p:nvSpPr>
+            <p:cNvPr id="16" name="Textfeld 15">
+              <a:extLst>
+                <a:ext uri="{FF2B5EF4-FFF2-40B4-BE49-F238E27FC236}">
+                  <a16:creationId xmlns:a16="http://schemas.microsoft.com/office/drawing/2014/main" id="{A8E15230-E56B-4CF5-9CF7-9D13D0319859}"/>
+                </a:ext>
+              </a:extLst>
+            </p:cNvPr>
+            <p:cNvSpPr txBox="1"/>
+            <p:nvPr/>
+          </p:nvSpPr>
+          <p:spPr>
+            <a:xfrm>
+              <a:off x="4367533" y="2427544"/>
+              <a:ext cx="792073" cy="523220"/>
+            </a:xfrm>
+            <a:prstGeom prst="rect">
+              <a:avLst/>
+            </a:prstGeom>
+            <a:noFill/>
+          </p:spPr>
+          <p:txBody>
+            <a:bodyPr wrap="square" rtlCol="0">
+              <a:spAutoFit/>
+            </a:bodyPr>
+            <a:lstStyle/>
+            <a:p>
+              <a:pPr algn="ctr"/>
+              <a:r>
+                <a:rPr lang="de-DE" sz="1400" dirty="0"/>
+                <a:t>Sprint</a:t>
+              </a:r>
+            </a:p>
+            <a:p>
+              <a:pPr algn="ctr"/>
+              <a:r>
+                <a:rPr lang="de-DE" sz="1400" dirty="0"/>
+                <a:t>Backlog</a:t>
+              </a:r>
+            </a:p>
+          </p:txBody>
+        </p:sp>
+        <p:sp>
+          <p:nvSpPr>
+            <p:cNvPr id="49" name="Textfeld 48">
+              <a:extLst>
+                <a:ext uri="{FF2B5EF4-FFF2-40B4-BE49-F238E27FC236}">
+                  <a16:creationId xmlns:a16="http://schemas.microsoft.com/office/drawing/2014/main" id="{0EA24480-59D1-4596-B44B-08681A79C430}"/>
+                </a:ext>
+              </a:extLst>
+            </p:cNvPr>
+            <p:cNvSpPr txBox="1"/>
+            <p:nvPr/>
+          </p:nvSpPr>
+          <p:spPr>
+            <a:xfrm>
+              <a:off x="7094341" y="1387776"/>
+              <a:ext cx="1216240" cy="523220"/>
+            </a:xfrm>
+            <a:prstGeom prst="rect">
+              <a:avLst/>
+            </a:prstGeom>
+            <a:noFill/>
+          </p:spPr>
+          <p:txBody>
+            <a:bodyPr wrap="square" rtlCol="0">
+              <a:spAutoFit/>
+            </a:bodyPr>
+            <a:lstStyle/>
+            <a:p>
+              <a:pPr algn="ctr"/>
+              <a:r>
+                <a:rPr lang="de-DE" sz="1400" dirty="0"/>
+                <a:t>Daily </a:t>
+              </a:r>
+              <a:r>
+                <a:rPr lang="de-DE" sz="1400" dirty="0" err="1"/>
+                <a:t>Scrum</a:t>
+              </a:r>
+              <a:endParaRPr lang="de-DE" sz="1400" dirty="0"/>
+            </a:p>
+            <a:p>
+              <a:pPr algn="ctr"/>
+              <a:r>
+                <a:rPr lang="de-DE" sz="1400" dirty="0"/>
+                <a:t>15 Minuten</a:t>
+              </a:r>
+            </a:p>
+          </p:txBody>
+        </p:sp>
+        <p:grpSp>
+          <p:nvGrpSpPr>
+            <p:cNvPr id="50" name="Gruppieren 49">
+              <a:extLst>
+                <a:ext uri="{FF2B5EF4-FFF2-40B4-BE49-F238E27FC236}">
+                  <a16:creationId xmlns:a16="http://schemas.microsoft.com/office/drawing/2014/main" id="{9FE00B96-B466-48BA-AA65-4716A986464B}"/>
+                </a:ext>
+              </a:extLst>
+            </p:cNvPr>
+            <p:cNvGrpSpPr/>
+            <p:nvPr/>
+          </p:nvGrpSpPr>
+          <p:grpSpPr>
+            <a:xfrm>
+              <a:off x="2264918" y="2431053"/>
+              <a:ext cx="2768591" cy="1357865"/>
+              <a:chOff x="5495407" y="4349512"/>
+              <a:chExt cx="2768591" cy="1357865"/>
             </a:xfrm>
           </p:grpSpPr>
           <p:sp>
             <p:nvSpPr>
-              <p:cNvPr id="5" name="Gleich 4">
+              <p:cNvPr id="31" name="Rechteck: abgerundete Ecken 30">
                 <a:extLst>
                   <a:ext uri="{FF2B5EF4-FFF2-40B4-BE49-F238E27FC236}">
-                    <a16:creationId xmlns:a16="http://schemas.microsoft.com/office/drawing/2014/main" id="{B985FAB8-D2DC-4AD9-AFD6-DC35B940B75A}"/>
+                    <a16:creationId xmlns:a16="http://schemas.microsoft.com/office/drawing/2014/main" id="{B1B16D79-296B-4C89-B57F-A688710158C2}"/>
                   </a:ext>
                 </a:extLst>
               </p:cNvPr>
@@ -4244,10 +4505,572 @@
             </p:nvSpPr>
             <p:spPr>
               <a:xfrm>
-                <a:off x="2032987" y="1984159"/>
-                <a:ext cx="905522" cy="559293"/>
+                <a:off x="5495407" y="4349512"/>
+                <a:ext cx="2064898" cy="1357865"/>
               </a:xfrm>
-              <a:prstGeom prst="mathEqual">
+              <a:prstGeom prst="roundRect">
+                <a:avLst/>
+              </a:prstGeom>
+              <a:noFill/>
+              <a:ln>
+                <a:solidFill>
+                  <a:schemeClr val="accent1">
+                    <a:lumMod val="75000"/>
+                  </a:schemeClr>
+                </a:solidFill>
+              </a:ln>
+            </p:spPr>
+            <p:style>
+              <a:lnRef idx="2">
+                <a:schemeClr val="accent1">
+                  <a:shade val="50000"/>
+                </a:schemeClr>
+              </a:lnRef>
+              <a:fillRef idx="1">
+                <a:schemeClr val="accent1"/>
+              </a:fillRef>
+              <a:effectRef idx="0">
+                <a:schemeClr val="accent1"/>
+              </a:effectRef>
+              <a:fontRef idx="minor">
+                <a:schemeClr val="lt1"/>
+              </a:fontRef>
+            </p:style>
+            <p:txBody>
+              <a:bodyPr rtlCol="0" anchor="ctr"/>
+              <a:lstStyle/>
+              <a:p>
+                <a:pPr algn="ctr"/>
+                <a:endParaRPr lang="de-DE"/>
+              </a:p>
+            </p:txBody>
+          </p:sp>
+          <p:pic>
+            <p:nvPicPr>
+              <p:cNvPr id="28" name="Grafik 27" descr="Kundenbewertung">
+                <a:extLst>
+                  <a:ext uri="{FF2B5EF4-FFF2-40B4-BE49-F238E27FC236}">
+                    <a16:creationId xmlns:a16="http://schemas.microsoft.com/office/drawing/2014/main" id="{1EB7D9A8-4296-4067-8B16-6E3D2A41EAE7}"/>
+                  </a:ext>
+                </a:extLst>
+              </p:cNvPr>
+              <p:cNvPicPr>
+                <a:picLocks noChangeAspect="1"/>
+              </p:cNvPicPr>
+              <p:nvPr/>
+            </p:nvPicPr>
+            <p:blipFill>
+              <a:blip r:embed="rId2">
+                <a:extLst>
+                  <a:ext uri="{28A0092B-C50C-407E-A947-70E740481C1C}">
+                    <a14:useLocalDpi xmlns:a14="http://schemas.microsoft.com/office/drawing/2010/main" val="0"/>
+                  </a:ext>
+                  <a:ext uri="{96DAC541-7B7A-43D3-8B79-37D633B846F1}">
+                    <asvg:svgBlip xmlns:asvg="http://schemas.microsoft.com/office/drawing/2016/SVG/main" r:embed="rId3"/>
+                  </a:ext>
+                </a:extLst>
+              </a:blip>
+              <a:stretch>
+                <a:fillRect/>
+              </a:stretch>
+            </p:blipFill>
+            <p:spPr>
+              <a:xfrm>
+                <a:off x="5875555" y="4873380"/>
+                <a:ext cx="687237" cy="687237"/>
+              </a:xfrm>
+              <a:prstGeom prst="rect">
+                <a:avLst/>
+              </a:prstGeom>
+            </p:spPr>
+          </p:pic>
+          <p:grpSp>
+            <p:nvGrpSpPr>
+              <p:cNvPr id="35" name="Gruppieren 34">
+                <a:extLst>
+                  <a:ext uri="{FF2B5EF4-FFF2-40B4-BE49-F238E27FC236}">
+                    <a16:creationId xmlns:a16="http://schemas.microsoft.com/office/drawing/2014/main" id="{FBED2C83-4424-4906-93CC-235A8AABD0DF}"/>
+                  </a:ext>
+                </a:extLst>
+              </p:cNvPr>
+              <p:cNvGrpSpPr/>
+              <p:nvPr/>
+            </p:nvGrpSpPr>
+            <p:grpSpPr>
+              <a:xfrm>
+                <a:off x="6856612" y="4852252"/>
+                <a:ext cx="1407386" cy="729495"/>
+                <a:chOff x="8498614" y="4602435"/>
+                <a:chExt cx="1407386" cy="729495"/>
+              </a:xfrm>
+            </p:grpSpPr>
+            <p:sp>
+              <p:nvSpPr>
+                <p:cNvPr id="33" name="Rechteck 32">
+                  <a:extLst>
+                    <a:ext uri="{FF2B5EF4-FFF2-40B4-BE49-F238E27FC236}">
+                      <a16:creationId xmlns:a16="http://schemas.microsoft.com/office/drawing/2014/main" id="{32E069A6-812C-426C-9199-163E387ECC85}"/>
+                    </a:ext>
+                  </a:extLst>
+                </p:cNvPr>
+                <p:cNvSpPr/>
+                <p:nvPr/>
+              </p:nvSpPr>
+              <p:spPr>
+                <a:xfrm>
+                  <a:off x="8498614" y="4602435"/>
+                  <a:ext cx="1407386" cy="729495"/>
+                </a:xfrm>
+                <a:prstGeom prst="rect">
+                  <a:avLst/>
+                </a:prstGeom>
+                <a:solidFill>
+                  <a:schemeClr val="bg1"/>
+                </a:solidFill>
+                <a:ln>
+                  <a:noFill/>
+                </a:ln>
+              </p:spPr>
+              <p:style>
+                <a:lnRef idx="2">
+                  <a:schemeClr val="accent1">
+                    <a:shade val="50000"/>
+                  </a:schemeClr>
+                </a:lnRef>
+                <a:fillRef idx="1">
+                  <a:schemeClr val="accent1"/>
+                </a:fillRef>
+                <a:effectRef idx="0">
+                  <a:schemeClr val="accent1"/>
+                </a:effectRef>
+                <a:fontRef idx="minor">
+                  <a:schemeClr val="lt1"/>
+                </a:fontRef>
+              </p:style>
+              <p:txBody>
+                <a:bodyPr rtlCol="0" anchor="ctr"/>
+                <a:lstStyle/>
+                <a:p>
+                  <a:pPr algn="ctr"/>
+                  <a:endParaRPr lang="de-DE" dirty="0"/>
+                </a:p>
+              </p:txBody>
+            </p:sp>
+            <p:grpSp>
+              <p:nvGrpSpPr>
+                <p:cNvPr id="17" name="Gruppieren 16">
+                  <a:extLst>
+                    <a:ext uri="{FF2B5EF4-FFF2-40B4-BE49-F238E27FC236}">
+                      <a16:creationId xmlns:a16="http://schemas.microsoft.com/office/drawing/2014/main" id="{D3A26FEE-1A1B-4CC9-B13D-38202CB32646}"/>
+                    </a:ext>
+                  </a:extLst>
+                </p:cNvPr>
+                <p:cNvGrpSpPr/>
+                <p:nvPr/>
+              </p:nvGrpSpPr>
+              <p:grpSpPr>
+                <a:xfrm>
+                  <a:off x="8716040" y="4670286"/>
+                  <a:ext cx="972534" cy="570920"/>
+                  <a:chOff x="3348769" y="2105486"/>
+                  <a:chExt cx="972534" cy="570920"/>
+                </a:xfrm>
+              </p:grpSpPr>
+              <p:sp>
+                <p:nvSpPr>
+                  <p:cNvPr id="3" name="Rechteck 2">
+                    <a:extLst>
+                      <a:ext uri="{FF2B5EF4-FFF2-40B4-BE49-F238E27FC236}">
+                        <a16:creationId xmlns:a16="http://schemas.microsoft.com/office/drawing/2014/main" id="{2CD84338-A14A-4DE7-8E69-3ED17E64F539}"/>
+                      </a:ext>
+                    </a:extLst>
+                  </p:cNvPr>
+                  <p:cNvSpPr/>
+                  <p:nvPr/>
+                </p:nvSpPr>
+                <p:spPr>
+                  <a:xfrm>
+                    <a:off x="3348769" y="2105488"/>
+                    <a:ext cx="279056" cy="158317"/>
+                  </a:xfrm>
+                  <a:prstGeom prst="rect">
+                    <a:avLst/>
+                  </a:prstGeom>
+                  <a:solidFill>
+                    <a:schemeClr val="tx2">
+                      <a:lumMod val="60000"/>
+                      <a:lumOff val="40000"/>
+                    </a:schemeClr>
+                  </a:solidFill>
+                  <a:ln>
+                    <a:solidFill>
+                      <a:schemeClr val="accent1">
+                        <a:lumMod val="75000"/>
+                      </a:schemeClr>
+                    </a:solidFill>
+                  </a:ln>
+                </p:spPr>
+                <p:style>
+                  <a:lnRef idx="2">
+                    <a:schemeClr val="accent1">
+                      <a:shade val="50000"/>
+                    </a:schemeClr>
+                  </a:lnRef>
+                  <a:fillRef idx="1">
+                    <a:schemeClr val="accent1"/>
+                  </a:fillRef>
+                  <a:effectRef idx="0">
+                    <a:schemeClr val="accent1"/>
+                  </a:effectRef>
+                  <a:fontRef idx="minor">
+                    <a:schemeClr val="lt1"/>
+                  </a:fontRef>
+                </p:style>
+                <p:txBody>
+                  <a:bodyPr rtlCol="0" anchor="ctr"/>
+                  <a:lstStyle/>
+                  <a:p>
+                    <a:pPr algn="ctr"/>
+                    <a:endParaRPr lang="de-DE"/>
+                  </a:p>
+                </p:txBody>
+              </p:sp>
+              <p:sp>
+                <p:nvSpPr>
+                  <p:cNvPr id="36" name="Rechteck 35">
+                    <a:extLst>
+                      <a:ext uri="{FF2B5EF4-FFF2-40B4-BE49-F238E27FC236}">
+                        <a16:creationId xmlns:a16="http://schemas.microsoft.com/office/drawing/2014/main" id="{0013CA64-288E-49AF-98EF-3B311D33A01F}"/>
+                      </a:ext>
+                    </a:extLst>
+                  </p:cNvPr>
+                  <p:cNvSpPr/>
+                  <p:nvPr/>
+                </p:nvSpPr>
+                <p:spPr>
+                  <a:xfrm>
+                    <a:off x="3695857" y="2105487"/>
+                    <a:ext cx="279056" cy="158317"/>
+                  </a:xfrm>
+                  <a:prstGeom prst="rect">
+                    <a:avLst/>
+                  </a:prstGeom>
+                  <a:solidFill>
+                    <a:schemeClr val="tx2">
+                      <a:lumMod val="60000"/>
+                      <a:lumOff val="40000"/>
+                    </a:schemeClr>
+                  </a:solidFill>
+                  <a:ln>
+                    <a:solidFill>
+                      <a:schemeClr val="accent1">
+                        <a:lumMod val="75000"/>
+                      </a:schemeClr>
+                    </a:solidFill>
+                  </a:ln>
+                </p:spPr>
+                <p:style>
+                  <a:lnRef idx="2">
+                    <a:schemeClr val="accent1">
+                      <a:shade val="50000"/>
+                    </a:schemeClr>
+                  </a:lnRef>
+                  <a:fillRef idx="1">
+                    <a:schemeClr val="accent1"/>
+                  </a:fillRef>
+                  <a:effectRef idx="0">
+                    <a:schemeClr val="accent1"/>
+                  </a:effectRef>
+                  <a:fontRef idx="minor">
+                    <a:schemeClr val="lt1"/>
+                  </a:fontRef>
+                </p:style>
+                <p:txBody>
+                  <a:bodyPr rtlCol="0" anchor="ctr"/>
+                  <a:lstStyle/>
+                  <a:p>
+                    <a:pPr algn="ctr"/>
+                    <a:endParaRPr lang="de-DE"/>
+                  </a:p>
+                </p:txBody>
+              </p:sp>
+              <p:sp>
+                <p:nvSpPr>
+                  <p:cNvPr id="38" name="Rechteck 37">
+                    <a:extLst>
+                      <a:ext uri="{FF2B5EF4-FFF2-40B4-BE49-F238E27FC236}">
+                        <a16:creationId xmlns:a16="http://schemas.microsoft.com/office/drawing/2014/main" id="{CF965A13-1D06-4662-A070-4E2760B921A5}"/>
+                      </a:ext>
+                    </a:extLst>
+                  </p:cNvPr>
+                  <p:cNvSpPr/>
+                  <p:nvPr/>
+                </p:nvSpPr>
+                <p:spPr>
+                  <a:xfrm>
+                    <a:off x="4042247" y="2105486"/>
+                    <a:ext cx="279056" cy="158317"/>
+                  </a:xfrm>
+                  <a:prstGeom prst="rect">
+                    <a:avLst/>
+                  </a:prstGeom>
+                  <a:solidFill>
+                    <a:schemeClr val="tx2">
+                      <a:lumMod val="60000"/>
+                      <a:lumOff val="40000"/>
+                    </a:schemeClr>
+                  </a:solidFill>
+                  <a:ln>
+                    <a:solidFill>
+                      <a:schemeClr val="accent1">
+                        <a:lumMod val="75000"/>
+                      </a:schemeClr>
+                    </a:solidFill>
+                  </a:ln>
+                </p:spPr>
+                <p:style>
+                  <a:lnRef idx="2">
+                    <a:schemeClr val="accent1">
+                      <a:shade val="50000"/>
+                    </a:schemeClr>
+                  </a:lnRef>
+                  <a:fillRef idx="1">
+                    <a:schemeClr val="accent1"/>
+                  </a:fillRef>
+                  <a:effectRef idx="0">
+                    <a:schemeClr val="accent1"/>
+                  </a:effectRef>
+                  <a:fontRef idx="minor">
+                    <a:schemeClr val="lt1"/>
+                  </a:fontRef>
+                </p:style>
+                <p:txBody>
+                  <a:bodyPr rtlCol="0" anchor="ctr"/>
+                  <a:lstStyle/>
+                  <a:p>
+                    <a:pPr algn="ctr"/>
+                    <a:endParaRPr lang="de-DE"/>
+                  </a:p>
+                </p:txBody>
+              </p:sp>
+              <p:sp>
+                <p:nvSpPr>
+                  <p:cNvPr id="39" name="Rechteck 38">
+                    <a:extLst>
+                      <a:ext uri="{FF2B5EF4-FFF2-40B4-BE49-F238E27FC236}">
+                        <a16:creationId xmlns:a16="http://schemas.microsoft.com/office/drawing/2014/main" id="{E6DD6748-7F22-43A4-8F06-2F1CC632B32C}"/>
+                      </a:ext>
+                    </a:extLst>
+                  </p:cNvPr>
+                  <p:cNvSpPr/>
+                  <p:nvPr/>
+                </p:nvSpPr>
+                <p:spPr>
+                  <a:xfrm>
+                    <a:off x="3348769" y="2305976"/>
+                    <a:ext cx="279056" cy="158317"/>
+                  </a:xfrm>
+                  <a:prstGeom prst="rect">
+                    <a:avLst/>
+                  </a:prstGeom>
+                  <a:solidFill>
+                    <a:schemeClr val="tx2">
+                      <a:lumMod val="60000"/>
+                      <a:lumOff val="40000"/>
+                    </a:schemeClr>
+                  </a:solidFill>
+                  <a:ln>
+                    <a:solidFill>
+                      <a:schemeClr val="accent1">
+                        <a:lumMod val="75000"/>
+                      </a:schemeClr>
+                    </a:solidFill>
+                  </a:ln>
+                </p:spPr>
+                <p:style>
+                  <a:lnRef idx="2">
+                    <a:schemeClr val="accent1">
+                      <a:shade val="50000"/>
+                    </a:schemeClr>
+                  </a:lnRef>
+                  <a:fillRef idx="1">
+                    <a:schemeClr val="accent1"/>
+                  </a:fillRef>
+                  <a:effectRef idx="0">
+                    <a:schemeClr val="accent1"/>
+                  </a:effectRef>
+                  <a:fontRef idx="minor">
+                    <a:schemeClr val="lt1"/>
+                  </a:fontRef>
+                </p:style>
+                <p:txBody>
+                  <a:bodyPr rtlCol="0" anchor="ctr"/>
+                  <a:lstStyle/>
+                  <a:p>
+                    <a:pPr algn="ctr"/>
+                    <a:endParaRPr lang="de-DE"/>
+                  </a:p>
+                </p:txBody>
+              </p:sp>
+              <p:sp>
+                <p:nvSpPr>
+                  <p:cNvPr id="41" name="Rechteck 40">
+                    <a:extLst>
+                      <a:ext uri="{FF2B5EF4-FFF2-40B4-BE49-F238E27FC236}">
+                        <a16:creationId xmlns:a16="http://schemas.microsoft.com/office/drawing/2014/main" id="{1EAB59CB-C95E-44F9-9BA5-BACAA40112A8}"/>
+                      </a:ext>
+                    </a:extLst>
+                  </p:cNvPr>
+                  <p:cNvSpPr/>
+                  <p:nvPr/>
+                </p:nvSpPr>
+                <p:spPr>
+                  <a:xfrm>
+                    <a:off x="3695857" y="2305976"/>
+                    <a:ext cx="279056" cy="158317"/>
+                  </a:xfrm>
+                  <a:prstGeom prst="rect">
+                    <a:avLst/>
+                  </a:prstGeom>
+                  <a:solidFill>
+                    <a:schemeClr val="tx2">
+                      <a:lumMod val="60000"/>
+                      <a:lumOff val="40000"/>
+                    </a:schemeClr>
+                  </a:solidFill>
+                  <a:ln>
+                    <a:solidFill>
+                      <a:schemeClr val="accent1">
+                        <a:lumMod val="75000"/>
+                      </a:schemeClr>
+                    </a:solidFill>
+                  </a:ln>
+                </p:spPr>
+                <p:style>
+                  <a:lnRef idx="2">
+                    <a:schemeClr val="accent1">
+                      <a:shade val="50000"/>
+                    </a:schemeClr>
+                  </a:lnRef>
+                  <a:fillRef idx="1">
+                    <a:schemeClr val="accent1"/>
+                  </a:fillRef>
+                  <a:effectRef idx="0">
+                    <a:schemeClr val="accent1"/>
+                  </a:effectRef>
+                  <a:fontRef idx="minor">
+                    <a:schemeClr val="lt1"/>
+                  </a:fontRef>
+                </p:style>
+                <p:txBody>
+                  <a:bodyPr rtlCol="0" anchor="ctr"/>
+                  <a:lstStyle/>
+                  <a:p>
+                    <a:pPr algn="ctr"/>
+                    <a:endParaRPr lang="de-DE"/>
+                  </a:p>
+                </p:txBody>
+              </p:sp>
+              <p:sp>
+                <p:nvSpPr>
+                  <p:cNvPr id="47" name="Rechteck 46">
+                    <a:extLst>
+                      <a:ext uri="{FF2B5EF4-FFF2-40B4-BE49-F238E27FC236}">
+                        <a16:creationId xmlns:a16="http://schemas.microsoft.com/office/drawing/2014/main" id="{9BAE45E5-74B5-4E4B-8279-691B2BBFB95E}"/>
+                      </a:ext>
+                    </a:extLst>
+                  </p:cNvPr>
+                  <p:cNvSpPr/>
+                  <p:nvPr/>
+                </p:nvSpPr>
+                <p:spPr>
+                  <a:xfrm>
+                    <a:off x="3348769" y="2518089"/>
+                    <a:ext cx="279056" cy="158317"/>
+                  </a:xfrm>
+                  <a:prstGeom prst="rect">
+                    <a:avLst/>
+                  </a:prstGeom>
+                  <a:solidFill>
+                    <a:schemeClr val="tx2">
+                      <a:lumMod val="60000"/>
+                      <a:lumOff val="40000"/>
+                    </a:schemeClr>
+                  </a:solidFill>
+                  <a:ln>
+                    <a:solidFill>
+                      <a:schemeClr val="accent1">
+                        <a:lumMod val="75000"/>
+                      </a:schemeClr>
+                    </a:solidFill>
+                  </a:ln>
+                </p:spPr>
+                <p:style>
+                  <a:lnRef idx="2">
+                    <a:schemeClr val="accent1">
+                      <a:shade val="50000"/>
+                    </a:schemeClr>
+                  </a:lnRef>
+                  <a:fillRef idx="1">
+                    <a:schemeClr val="accent1"/>
+                  </a:fillRef>
+                  <a:effectRef idx="0">
+                    <a:schemeClr val="accent1"/>
+                  </a:effectRef>
+                  <a:fontRef idx="minor">
+                    <a:schemeClr val="lt1"/>
+                  </a:fontRef>
+                </p:style>
+                <p:txBody>
+                  <a:bodyPr rtlCol="0" anchor="ctr"/>
+                  <a:lstStyle/>
+                  <a:p>
+                    <a:pPr algn="ctr"/>
+                    <a:endParaRPr lang="de-DE"/>
+                  </a:p>
+                </p:txBody>
+              </p:sp>
+            </p:grpSp>
+          </p:grpSp>
+        </p:grpSp>
+        <p:grpSp>
+          <p:nvGrpSpPr>
+            <p:cNvPr id="2" name="Gruppieren 1">
+              <a:extLst>
+                <a:ext uri="{FF2B5EF4-FFF2-40B4-BE49-F238E27FC236}">
+                  <a16:creationId xmlns:a16="http://schemas.microsoft.com/office/drawing/2014/main" id="{8C9CE274-D08A-461A-A0EA-AFC321233BD9}"/>
+                </a:ext>
+              </a:extLst>
+            </p:cNvPr>
+            <p:cNvGrpSpPr/>
+            <p:nvPr/>
+          </p:nvGrpSpPr>
+          <p:grpSpPr>
+            <a:xfrm>
+              <a:off x="4836113" y="1839120"/>
+              <a:ext cx="2956262" cy="2142256"/>
+              <a:chOff x="5197225" y="1929091"/>
+              <a:chExt cx="2597367" cy="1873289"/>
+            </a:xfrm>
+          </p:grpSpPr>
+          <p:sp>
+            <p:nvSpPr>
+              <p:cNvPr id="42" name="Ellipse 41">
+                <a:extLst>
+                  <a:ext uri="{FF2B5EF4-FFF2-40B4-BE49-F238E27FC236}">
+                    <a16:creationId xmlns:a16="http://schemas.microsoft.com/office/drawing/2014/main" id="{49CF15B1-3251-487A-858D-2ADAEAA1E346}"/>
+                  </a:ext>
+                </a:extLst>
+              </p:cNvPr>
+              <p:cNvSpPr/>
+              <p:nvPr/>
+            </p:nvSpPr>
+            <p:spPr>
+              <a:xfrm>
+                <a:off x="6878320" y="1929091"/>
+                <a:ext cx="531495" cy="445770"/>
+              </a:xfrm>
+              <a:prstGeom prst="ellipse">
                 <a:avLst/>
               </a:prstGeom>
               <a:solidFill>
@@ -4278,20 +5101,16 @@
               <a:lstStyle/>
               <a:p>
                 <a:pPr algn="ctr"/>
-                <a:endParaRPr lang="de-DE">
-                  <a:solidFill>
-                    <a:schemeClr val="tx1"/>
-                  </a:solidFill>
-                </a:endParaRPr>
+                <a:endParaRPr lang="de-DE"/>
               </a:p>
             </p:txBody>
           </p:sp>
           <p:sp>
             <p:nvSpPr>
-              <p:cNvPr id="6" name="Gleich 5">
+              <p:cNvPr id="40" name="Rechteck 39">
                 <a:extLst>
                   <a:ext uri="{FF2B5EF4-FFF2-40B4-BE49-F238E27FC236}">
-                    <a16:creationId xmlns:a16="http://schemas.microsoft.com/office/drawing/2014/main" id="{17C78BC5-5490-41DD-958D-78FFB8EE1552}"/>
+                    <a16:creationId xmlns:a16="http://schemas.microsoft.com/office/drawing/2014/main" id="{38EA6EE8-D998-4B31-8F1B-121FCF23E7AC}"/>
                   </a:ext>
                 </a:extLst>
               </p:cNvPr>
@@ -4300,10 +5119,10 @@
             </p:nvSpPr>
             <p:spPr>
               <a:xfrm>
-                <a:off x="2032987" y="2385135"/>
-                <a:ext cx="905522" cy="559293"/>
+                <a:off x="5197225" y="3227174"/>
+                <a:ext cx="1263931" cy="394916"/>
               </a:xfrm>
-              <a:prstGeom prst="mathEqual">
+              <a:prstGeom prst="rect">
                 <a:avLst/>
               </a:prstGeom>
               <a:solidFill>
@@ -4334,41 +5153,16 @@
               <a:lstStyle/>
               <a:p>
                 <a:pPr algn="ctr"/>
-                <a:endParaRPr lang="de-DE">
-                  <a:solidFill>
-                    <a:schemeClr val="tx1"/>
-                  </a:solidFill>
-                </a:endParaRPr>
+                <a:endParaRPr lang="de-DE"/>
               </a:p>
             </p:txBody>
           </p:sp>
-        </p:grpSp>
-        <p:grpSp>
-          <p:nvGrpSpPr>
-            <p:cNvPr id="8" name="Gruppieren 7">
-              <a:extLst>
-                <a:ext uri="{FF2B5EF4-FFF2-40B4-BE49-F238E27FC236}">
-                  <a16:creationId xmlns:a16="http://schemas.microsoft.com/office/drawing/2014/main" id="{B63045AA-B569-4C9A-8F72-8D37572AEFE1}"/>
-                </a:ext>
-              </a:extLst>
-            </p:cNvPr>
-            <p:cNvGrpSpPr/>
-            <p:nvPr/>
-          </p:nvGrpSpPr>
-          <p:grpSpPr>
-            <a:xfrm>
-              <a:off x="2032987" y="2803123"/>
-              <a:ext cx="905522" cy="960269"/>
-              <a:chOff x="2032987" y="1984159"/>
-              <a:chExt cx="905522" cy="960269"/>
-            </a:xfrm>
-          </p:grpSpPr>
           <p:sp>
             <p:nvSpPr>
-              <p:cNvPr id="9" name="Gleich 8">
+              <p:cNvPr id="21" name="Ellipse 20">
                 <a:extLst>
                   <a:ext uri="{FF2B5EF4-FFF2-40B4-BE49-F238E27FC236}">
-                    <a16:creationId xmlns:a16="http://schemas.microsoft.com/office/drawing/2014/main" id="{E9AD7222-FFDC-4BCF-9F5B-CE89218474E2}"/>
+                    <a16:creationId xmlns:a16="http://schemas.microsoft.com/office/drawing/2014/main" id="{5198C066-1DD8-4B4B-A41C-8188DA0A8D74}"/>
                   </a:ext>
                 </a:extLst>
               </p:cNvPr>
@@ -4377,10 +5171,10 @@
             </p:nvSpPr>
             <p:spPr>
               <a:xfrm>
-                <a:off x="2032987" y="1984159"/>
-                <a:ext cx="905522" cy="559293"/>
+                <a:off x="5495278" y="2031505"/>
+                <a:ext cx="1864310" cy="1590584"/>
               </a:xfrm>
-              <a:prstGeom prst="mathEqual">
+              <a:prstGeom prst="ellipse">
                 <a:avLst/>
               </a:prstGeom>
               <a:solidFill>
@@ -4411,20 +5205,16 @@
               <a:lstStyle/>
               <a:p>
                 <a:pPr algn="ctr"/>
-                <a:endParaRPr lang="de-DE">
-                  <a:solidFill>
-                    <a:schemeClr val="tx1"/>
-                  </a:solidFill>
-                </a:endParaRPr>
+                <a:endParaRPr lang="de-DE"/>
               </a:p>
             </p:txBody>
           </p:sp>
           <p:sp>
             <p:nvSpPr>
-              <p:cNvPr id="10" name="Gleich 9">
+              <p:cNvPr id="22" name="Ellipse 21">
                 <a:extLst>
                   <a:ext uri="{FF2B5EF4-FFF2-40B4-BE49-F238E27FC236}">
-                    <a16:creationId xmlns:a16="http://schemas.microsoft.com/office/drawing/2014/main" id="{02A29B78-C8B4-4471-9955-274D551DC026}"/>
+                    <a16:creationId xmlns:a16="http://schemas.microsoft.com/office/drawing/2014/main" id="{812E83A4-01AE-443E-B316-37D333E16031}"/>
                   </a:ext>
                 </a:extLst>
               </p:cNvPr>
@@ -4433,16 +5223,15 @@
             </p:nvSpPr>
             <p:spPr>
               <a:xfrm>
-                <a:off x="2032987" y="2385135"/>
-                <a:ext cx="905522" cy="559293"/>
+                <a:off x="5860001" y="2376994"/>
+                <a:ext cx="1134863" cy="852258"/>
               </a:xfrm>
-              <a:prstGeom prst="mathEqual">
+              <a:prstGeom prst="ellipse">
                 <a:avLst/>
               </a:prstGeom>
               <a:solidFill>
-                <a:schemeClr val="tx2">
-                  <a:lumMod val="60000"/>
-                  <a:lumOff val="40000"/>
+                <a:schemeClr val="bg1">
+                  <a:lumMod val="95000"/>
                 </a:schemeClr>
               </a:solidFill>
             </p:spPr>
@@ -4467,84 +5256,1489 @@
               <a:lstStyle/>
               <a:p>
                 <a:pPr algn="ctr"/>
-                <a:endParaRPr lang="de-DE">
-                  <a:solidFill>
-                    <a:schemeClr val="tx1"/>
-                  </a:solidFill>
-                </a:endParaRPr>
+                <a:endParaRPr lang="de-DE"/>
               </a:p>
             </p:txBody>
           </p:sp>
+          <p:sp>
+            <p:nvSpPr>
+              <p:cNvPr id="23" name="Pfeil: nach rechts 22">
+                <a:extLst>
+                  <a:ext uri="{FF2B5EF4-FFF2-40B4-BE49-F238E27FC236}">
+                    <a16:creationId xmlns:a16="http://schemas.microsoft.com/office/drawing/2014/main" id="{3F8C877B-0ED5-4520-869B-F0E828EDB984}"/>
+                  </a:ext>
+                </a:extLst>
+              </p:cNvPr>
+              <p:cNvSpPr/>
+              <p:nvPr/>
+            </p:nvSpPr>
+            <p:spPr>
+              <a:xfrm>
+                <a:off x="6427432" y="3037856"/>
+                <a:ext cx="1367160" cy="764524"/>
+              </a:xfrm>
+              <a:prstGeom prst="rightArrow">
+                <a:avLst/>
+              </a:prstGeom>
+              <a:solidFill>
+                <a:schemeClr val="tx2">
+                  <a:lumMod val="60000"/>
+                  <a:lumOff val="40000"/>
+                </a:schemeClr>
+              </a:solidFill>
+              <a:ln>
+                <a:solidFill>
+                  <a:schemeClr val="tx2">
+                    <a:lumMod val="60000"/>
+                    <a:lumOff val="40000"/>
+                  </a:schemeClr>
+                </a:solidFill>
+              </a:ln>
+            </p:spPr>
+            <p:style>
+              <a:lnRef idx="2">
+                <a:schemeClr val="accent1">
+                  <a:shade val="50000"/>
+                </a:schemeClr>
+              </a:lnRef>
+              <a:fillRef idx="1">
+                <a:schemeClr val="accent1"/>
+              </a:fillRef>
+              <a:effectRef idx="0">
+                <a:schemeClr val="accent1"/>
+              </a:effectRef>
+              <a:fontRef idx="minor">
+                <a:schemeClr val="lt1"/>
+              </a:fontRef>
+            </p:style>
+            <p:txBody>
+              <a:bodyPr rtlCol="0" anchor="ctr"/>
+              <a:lstStyle/>
+              <a:p>
+                <a:pPr algn="ctr"/>
+                <a:endParaRPr lang="de-DE"/>
+              </a:p>
+            </p:txBody>
+          </p:sp>
+          <p:cxnSp>
+            <p:nvCxnSpPr>
+              <p:cNvPr id="25" name="Gerader Verbinder 24">
+                <a:extLst>
+                  <a:ext uri="{FF2B5EF4-FFF2-40B4-BE49-F238E27FC236}">
+                    <a16:creationId xmlns:a16="http://schemas.microsoft.com/office/drawing/2014/main" id="{3A79BDAE-3F04-4623-BAF5-5FAD5C0B7DF6}"/>
+                  </a:ext>
+                </a:extLst>
+              </p:cNvPr>
+              <p:cNvCxnSpPr>
+                <a:cxnSpLocks/>
+              </p:cNvCxnSpPr>
+              <p:nvPr/>
+            </p:nvCxnSpPr>
+            <p:spPr>
+              <a:xfrm>
+                <a:off x="6422352" y="3622089"/>
+                <a:ext cx="994448" cy="0"/>
+              </a:xfrm>
+              <a:prstGeom prst="line">
+                <a:avLst/>
+              </a:prstGeom>
+              <a:ln w="12700">
+                <a:solidFill>
+                  <a:schemeClr val="accent1">
+                    <a:lumMod val="75000"/>
+                  </a:schemeClr>
+                </a:solidFill>
+              </a:ln>
+            </p:spPr>
+            <p:style>
+              <a:lnRef idx="1">
+                <a:schemeClr val="accent1"/>
+              </a:lnRef>
+              <a:fillRef idx="0">
+                <a:schemeClr val="accent1"/>
+              </a:fillRef>
+              <a:effectRef idx="0">
+                <a:schemeClr val="accent1"/>
+              </a:effectRef>
+              <a:fontRef idx="minor">
+                <a:schemeClr val="tx1"/>
+              </a:fontRef>
+            </p:style>
+          </p:cxnSp>
+          <p:cxnSp>
+            <p:nvCxnSpPr>
+              <p:cNvPr id="27" name="Gerader Verbinder 26">
+                <a:extLst>
+                  <a:ext uri="{FF2B5EF4-FFF2-40B4-BE49-F238E27FC236}">
+                    <a16:creationId xmlns:a16="http://schemas.microsoft.com/office/drawing/2014/main" id="{0008703D-4744-47BC-97E8-E442A27654CA}"/>
+                  </a:ext>
+                </a:extLst>
+              </p:cNvPr>
+              <p:cNvCxnSpPr>
+                <a:cxnSpLocks/>
+              </p:cNvCxnSpPr>
+              <p:nvPr/>
+            </p:nvCxnSpPr>
+            <p:spPr>
+              <a:xfrm flipV="1">
+                <a:off x="6420447" y="3229252"/>
+                <a:ext cx="989368" cy="407"/>
+              </a:xfrm>
+              <a:prstGeom prst="line">
+                <a:avLst/>
+              </a:prstGeom>
+              <a:ln w="12700">
+                <a:solidFill>
+                  <a:schemeClr val="accent1">
+                    <a:lumMod val="75000"/>
+                  </a:schemeClr>
+                </a:solidFill>
+              </a:ln>
+            </p:spPr>
+            <p:style>
+              <a:lnRef idx="1">
+                <a:schemeClr val="accent1"/>
+              </a:lnRef>
+              <a:fillRef idx="0">
+                <a:schemeClr val="accent1"/>
+              </a:fillRef>
+              <a:effectRef idx="0">
+                <a:schemeClr val="accent1"/>
+              </a:effectRef>
+              <a:fontRef idx="minor">
+                <a:schemeClr val="tx1"/>
+              </a:fontRef>
+            </p:style>
+          </p:cxnSp>
+          <p:cxnSp>
+            <p:nvCxnSpPr>
+              <p:cNvPr id="29" name="Gerader Verbinder 28">
+                <a:extLst>
+                  <a:ext uri="{FF2B5EF4-FFF2-40B4-BE49-F238E27FC236}">
+                    <a16:creationId xmlns:a16="http://schemas.microsoft.com/office/drawing/2014/main" id="{084A057A-79BF-4B88-A8FC-ECD8CCF89ADE}"/>
+                  </a:ext>
+                </a:extLst>
+              </p:cNvPr>
+              <p:cNvCxnSpPr>
+                <a:cxnSpLocks/>
+                <a:endCxn id="23" idx="2"/>
+              </p:cNvCxnSpPr>
+              <p:nvPr/>
+            </p:nvCxnSpPr>
+            <p:spPr>
+              <a:xfrm>
+                <a:off x="7411720" y="3622089"/>
+                <a:ext cx="610" cy="180291"/>
+              </a:xfrm>
+              <a:prstGeom prst="line">
+                <a:avLst/>
+              </a:prstGeom>
+              <a:ln w="9525">
+                <a:solidFill>
+                  <a:schemeClr val="accent1">
+                    <a:lumMod val="75000"/>
+                  </a:schemeClr>
+                </a:solidFill>
+              </a:ln>
+            </p:spPr>
+            <p:style>
+              <a:lnRef idx="1">
+                <a:schemeClr val="accent1"/>
+              </a:lnRef>
+              <a:fillRef idx="0">
+                <a:schemeClr val="accent1"/>
+              </a:fillRef>
+              <a:effectRef idx="0">
+                <a:schemeClr val="accent1"/>
+              </a:effectRef>
+              <a:fontRef idx="minor">
+                <a:schemeClr val="tx1"/>
+              </a:fontRef>
+            </p:style>
+          </p:cxnSp>
+          <p:cxnSp>
+            <p:nvCxnSpPr>
+              <p:cNvPr id="32" name="Gerader Verbinder 31">
+                <a:extLst>
+                  <a:ext uri="{FF2B5EF4-FFF2-40B4-BE49-F238E27FC236}">
+                    <a16:creationId xmlns:a16="http://schemas.microsoft.com/office/drawing/2014/main" id="{156EA9CC-B5B8-4AA7-AC37-52822B076A00}"/>
+                  </a:ext>
+                </a:extLst>
+              </p:cNvPr>
+              <p:cNvCxnSpPr>
+                <a:cxnSpLocks/>
+              </p:cNvCxnSpPr>
+              <p:nvPr/>
+            </p:nvCxnSpPr>
+            <p:spPr>
+              <a:xfrm>
+                <a:off x="7412330" y="3040396"/>
+                <a:ext cx="0" cy="191396"/>
+              </a:xfrm>
+              <a:prstGeom prst="line">
+                <a:avLst/>
+              </a:prstGeom>
+              <a:ln w="9525">
+                <a:solidFill>
+                  <a:schemeClr val="accent1">
+                    <a:lumMod val="75000"/>
+                  </a:schemeClr>
+                </a:solidFill>
+              </a:ln>
+            </p:spPr>
+            <p:style>
+              <a:lnRef idx="1">
+                <a:schemeClr val="accent1"/>
+              </a:lnRef>
+              <a:fillRef idx="0">
+                <a:schemeClr val="accent1"/>
+              </a:fillRef>
+              <a:effectRef idx="0">
+                <a:schemeClr val="accent1"/>
+              </a:effectRef>
+              <a:fontRef idx="minor">
+                <a:schemeClr val="tx1"/>
+              </a:fontRef>
+            </p:style>
+          </p:cxnSp>
+          <p:cxnSp>
+            <p:nvCxnSpPr>
+              <p:cNvPr id="34" name="Gerader Verbinder 33">
+                <a:extLst>
+                  <a:ext uri="{FF2B5EF4-FFF2-40B4-BE49-F238E27FC236}">
+                    <a16:creationId xmlns:a16="http://schemas.microsoft.com/office/drawing/2014/main" id="{B3AFAC6F-7051-4FC6-BFDD-879DB6BFEC3B}"/>
+                  </a:ext>
+                </a:extLst>
+              </p:cNvPr>
+              <p:cNvCxnSpPr>
+                <a:cxnSpLocks/>
+                <a:stCxn id="23" idx="0"/>
+                <a:endCxn id="23" idx="3"/>
+              </p:cNvCxnSpPr>
+              <p:nvPr/>
+            </p:nvCxnSpPr>
+            <p:spPr>
+              <a:xfrm>
+                <a:off x="7412330" y="3037856"/>
+                <a:ext cx="382262" cy="382262"/>
+              </a:xfrm>
+              <a:prstGeom prst="line">
+                <a:avLst/>
+              </a:prstGeom>
+              <a:ln w="9525">
+                <a:solidFill>
+                  <a:schemeClr val="accent1">
+                    <a:lumMod val="75000"/>
+                  </a:schemeClr>
+                </a:solidFill>
+              </a:ln>
+            </p:spPr>
+            <p:style>
+              <a:lnRef idx="1">
+                <a:schemeClr val="accent1"/>
+              </a:lnRef>
+              <a:fillRef idx="0">
+                <a:schemeClr val="accent1"/>
+              </a:fillRef>
+              <a:effectRef idx="0">
+                <a:schemeClr val="accent1"/>
+              </a:effectRef>
+              <a:fontRef idx="minor">
+                <a:schemeClr val="tx1"/>
+              </a:fontRef>
+            </p:style>
+          </p:cxnSp>
+          <p:cxnSp>
+            <p:nvCxnSpPr>
+              <p:cNvPr id="37" name="Gerader Verbinder 36">
+                <a:extLst>
+                  <a:ext uri="{FF2B5EF4-FFF2-40B4-BE49-F238E27FC236}">
+                    <a16:creationId xmlns:a16="http://schemas.microsoft.com/office/drawing/2014/main" id="{6F16C1DD-525D-42F1-9A5C-380C87E7C92F}"/>
+                  </a:ext>
+                </a:extLst>
+              </p:cNvPr>
+              <p:cNvCxnSpPr>
+                <a:cxnSpLocks/>
+                <a:stCxn id="23" idx="2"/>
+                <a:endCxn id="23" idx="3"/>
+              </p:cNvCxnSpPr>
+              <p:nvPr/>
+            </p:nvCxnSpPr>
+            <p:spPr>
+              <a:xfrm flipV="1">
+                <a:off x="7412330" y="3420118"/>
+                <a:ext cx="382262" cy="382262"/>
+              </a:xfrm>
+              <a:prstGeom prst="line">
+                <a:avLst/>
+              </a:prstGeom>
+              <a:ln w="9525">
+                <a:solidFill>
+                  <a:schemeClr val="accent1">
+                    <a:lumMod val="75000"/>
+                  </a:schemeClr>
+                </a:solidFill>
+              </a:ln>
+            </p:spPr>
+            <p:style>
+              <a:lnRef idx="1">
+                <a:schemeClr val="accent1"/>
+              </a:lnRef>
+              <a:fillRef idx="0">
+                <a:schemeClr val="accent1"/>
+              </a:fillRef>
+              <a:effectRef idx="0">
+                <a:schemeClr val="accent1"/>
+              </a:effectRef>
+              <a:fontRef idx="minor">
+                <a:schemeClr val="tx1"/>
+              </a:fontRef>
+            </p:style>
+          </p:cxnSp>
+          <p:sp>
+            <p:nvSpPr>
+              <p:cNvPr id="43" name="Ellipse 42">
+                <a:extLst>
+                  <a:ext uri="{FF2B5EF4-FFF2-40B4-BE49-F238E27FC236}">
+                    <a16:creationId xmlns:a16="http://schemas.microsoft.com/office/drawing/2014/main" id="{04E37C9B-BE7F-4452-A256-8E2A62C713F3}"/>
+                  </a:ext>
+                </a:extLst>
+              </p:cNvPr>
+              <p:cNvSpPr/>
+              <p:nvPr/>
+            </p:nvSpPr>
+            <p:spPr>
+              <a:xfrm>
+                <a:off x="7003763" y="2033866"/>
+                <a:ext cx="280608" cy="236220"/>
+              </a:xfrm>
+              <a:prstGeom prst="ellipse">
+                <a:avLst/>
+              </a:prstGeom>
+              <a:solidFill>
+                <a:schemeClr val="bg1"/>
+              </a:solidFill>
+            </p:spPr>
+            <p:style>
+              <a:lnRef idx="2">
+                <a:schemeClr val="accent1">
+                  <a:shade val="50000"/>
+                </a:schemeClr>
+              </a:lnRef>
+              <a:fillRef idx="1">
+                <a:schemeClr val="accent1"/>
+              </a:fillRef>
+              <a:effectRef idx="0">
+                <a:schemeClr val="accent1"/>
+              </a:effectRef>
+              <a:fontRef idx="minor">
+                <a:schemeClr val="lt1"/>
+              </a:fontRef>
+            </p:style>
+            <p:txBody>
+              <a:bodyPr rtlCol="0" anchor="ctr"/>
+              <a:lstStyle/>
+              <a:p>
+                <a:pPr algn="ctr"/>
+                <a:endParaRPr lang="de-DE"/>
+              </a:p>
+            </p:txBody>
+          </p:sp>
+          <p:sp>
+            <p:nvSpPr>
+              <p:cNvPr id="44" name="Pfeil: nach unten 43">
+                <a:extLst>
+                  <a:ext uri="{FF2B5EF4-FFF2-40B4-BE49-F238E27FC236}">
+                    <a16:creationId xmlns:a16="http://schemas.microsoft.com/office/drawing/2014/main" id="{2F27B121-BD89-409C-970E-D0D1FBD35258}"/>
+                  </a:ext>
+                </a:extLst>
+              </p:cNvPr>
+              <p:cNvSpPr/>
+              <p:nvPr/>
+            </p:nvSpPr>
+            <p:spPr>
+              <a:xfrm>
+                <a:off x="7227126" y="2126752"/>
+                <a:ext cx="235442" cy="123053"/>
+              </a:xfrm>
+              <a:prstGeom prst="downArrow">
+                <a:avLst/>
+              </a:prstGeom>
+              <a:solidFill>
+                <a:schemeClr val="tx2">
+                  <a:lumMod val="60000"/>
+                  <a:lumOff val="40000"/>
+                </a:schemeClr>
+              </a:solidFill>
+              <a:ln>
+                <a:solidFill>
+                  <a:schemeClr val="tx2">
+                    <a:lumMod val="60000"/>
+                    <a:lumOff val="40000"/>
+                  </a:schemeClr>
+                </a:solidFill>
+              </a:ln>
+            </p:spPr>
+            <p:style>
+              <a:lnRef idx="2">
+                <a:schemeClr val="accent1">
+                  <a:shade val="50000"/>
+                </a:schemeClr>
+              </a:lnRef>
+              <a:fillRef idx="1">
+                <a:schemeClr val="accent1"/>
+              </a:fillRef>
+              <a:effectRef idx="0">
+                <a:schemeClr val="accent1"/>
+              </a:effectRef>
+              <a:fontRef idx="minor">
+                <a:schemeClr val="lt1"/>
+              </a:fontRef>
+            </p:style>
+            <p:txBody>
+              <a:bodyPr rtlCol="0" anchor="ctr"/>
+              <a:lstStyle/>
+              <a:p>
+                <a:pPr algn="ctr"/>
+                <a:endParaRPr lang="de-DE"/>
+              </a:p>
+            </p:txBody>
+          </p:sp>
+          <p:cxnSp>
+            <p:nvCxnSpPr>
+              <p:cNvPr id="45" name="Gerader Verbinder 44">
+                <a:extLst>
+                  <a:ext uri="{FF2B5EF4-FFF2-40B4-BE49-F238E27FC236}">
+                    <a16:creationId xmlns:a16="http://schemas.microsoft.com/office/drawing/2014/main" id="{9147ECAB-6466-4738-AE10-C38F85F960F7}"/>
+                  </a:ext>
+                </a:extLst>
+              </p:cNvPr>
+              <p:cNvCxnSpPr>
+                <a:cxnSpLocks/>
+                <a:stCxn id="44" idx="3"/>
+                <a:endCxn id="44" idx="2"/>
+              </p:cNvCxnSpPr>
+              <p:nvPr/>
+            </p:nvCxnSpPr>
+            <p:spPr>
+              <a:xfrm flipH="1">
+                <a:off x="7344847" y="2188279"/>
+                <a:ext cx="117721" cy="61526"/>
+              </a:xfrm>
+              <a:prstGeom prst="line">
+                <a:avLst/>
+              </a:prstGeom>
+              <a:ln w="12700">
+                <a:solidFill>
+                  <a:schemeClr val="accent1">
+                    <a:lumMod val="75000"/>
+                  </a:schemeClr>
+                </a:solidFill>
+              </a:ln>
+            </p:spPr>
+            <p:style>
+              <a:lnRef idx="1">
+                <a:schemeClr val="accent1"/>
+              </a:lnRef>
+              <a:fillRef idx="0">
+                <a:schemeClr val="accent1"/>
+              </a:fillRef>
+              <a:effectRef idx="0">
+                <a:schemeClr val="accent1"/>
+              </a:effectRef>
+              <a:fontRef idx="minor">
+                <a:schemeClr val="tx1"/>
+              </a:fontRef>
+            </p:style>
+          </p:cxnSp>
+          <p:cxnSp>
+            <p:nvCxnSpPr>
+              <p:cNvPr id="46" name="Gerader Verbinder 45">
+                <a:extLst>
+                  <a:ext uri="{FF2B5EF4-FFF2-40B4-BE49-F238E27FC236}">
+                    <a16:creationId xmlns:a16="http://schemas.microsoft.com/office/drawing/2014/main" id="{474371A1-3181-4B60-BE3C-E419EF7059E1}"/>
+                  </a:ext>
+                </a:extLst>
+              </p:cNvPr>
+              <p:cNvCxnSpPr>
+                <a:cxnSpLocks/>
+              </p:cNvCxnSpPr>
+              <p:nvPr/>
+            </p:nvCxnSpPr>
+            <p:spPr>
+              <a:xfrm>
+                <a:off x="7280551" y="2116455"/>
+                <a:ext cx="0" cy="62595"/>
+              </a:xfrm>
+              <a:prstGeom prst="line">
+                <a:avLst/>
+              </a:prstGeom>
+              <a:ln w="12700">
+                <a:solidFill>
+                  <a:schemeClr val="accent1">
+                    <a:lumMod val="75000"/>
+                  </a:schemeClr>
+                </a:solidFill>
+              </a:ln>
+            </p:spPr>
+            <p:style>
+              <a:lnRef idx="1">
+                <a:schemeClr val="accent1"/>
+              </a:lnRef>
+              <a:fillRef idx="0">
+                <a:schemeClr val="accent1"/>
+              </a:fillRef>
+              <a:effectRef idx="0">
+                <a:schemeClr val="accent1"/>
+              </a:effectRef>
+              <a:fontRef idx="minor">
+                <a:schemeClr val="tx1"/>
+              </a:fontRef>
+            </p:style>
+          </p:cxnSp>
+          <p:cxnSp>
+            <p:nvCxnSpPr>
+              <p:cNvPr id="51" name="Gerader Verbinder 50">
+                <a:extLst>
+                  <a:ext uri="{FF2B5EF4-FFF2-40B4-BE49-F238E27FC236}">
+                    <a16:creationId xmlns:a16="http://schemas.microsoft.com/office/drawing/2014/main" id="{7BBC6EDD-E2C3-4DAA-A0C1-4BD4267EA974}"/>
+                  </a:ext>
+                </a:extLst>
+              </p:cNvPr>
+              <p:cNvCxnSpPr>
+                <a:cxnSpLocks/>
+              </p:cNvCxnSpPr>
+              <p:nvPr/>
+            </p:nvCxnSpPr>
+            <p:spPr>
+              <a:xfrm>
+                <a:off x="7406630" y="2116455"/>
+                <a:ext cx="0" cy="62595"/>
+              </a:xfrm>
+              <a:prstGeom prst="line">
+                <a:avLst/>
+              </a:prstGeom>
+              <a:ln w="12700">
+                <a:solidFill>
+                  <a:schemeClr val="accent1">
+                    <a:lumMod val="75000"/>
+                  </a:schemeClr>
+                </a:solidFill>
+              </a:ln>
+            </p:spPr>
+            <p:style>
+              <a:lnRef idx="1">
+                <a:schemeClr val="accent1"/>
+              </a:lnRef>
+              <a:fillRef idx="0">
+                <a:schemeClr val="accent1"/>
+              </a:fillRef>
+              <a:effectRef idx="0">
+                <a:schemeClr val="accent1"/>
+              </a:effectRef>
+              <a:fontRef idx="minor">
+                <a:schemeClr val="tx1"/>
+              </a:fontRef>
+            </p:style>
+          </p:cxnSp>
+          <p:cxnSp>
+            <p:nvCxnSpPr>
+              <p:cNvPr id="55" name="Gerader Verbinder 54">
+                <a:extLst>
+                  <a:ext uri="{FF2B5EF4-FFF2-40B4-BE49-F238E27FC236}">
+                    <a16:creationId xmlns:a16="http://schemas.microsoft.com/office/drawing/2014/main" id="{0ACA2074-2136-4B8E-AFC7-AE4A76E5996C}"/>
+                  </a:ext>
+                </a:extLst>
+              </p:cNvPr>
+              <p:cNvCxnSpPr>
+                <a:cxnSpLocks/>
+                <a:stCxn id="44" idx="2"/>
+                <a:endCxn id="44" idx="1"/>
+              </p:cNvCxnSpPr>
+              <p:nvPr/>
+            </p:nvCxnSpPr>
+            <p:spPr>
+              <a:xfrm flipH="1" flipV="1">
+                <a:off x="7227126" y="2188279"/>
+                <a:ext cx="117721" cy="61526"/>
+              </a:xfrm>
+              <a:prstGeom prst="line">
+                <a:avLst/>
+              </a:prstGeom>
+              <a:ln w="12700">
+                <a:solidFill>
+                  <a:schemeClr val="accent1">
+                    <a:lumMod val="75000"/>
+                  </a:schemeClr>
+                </a:solidFill>
+              </a:ln>
+            </p:spPr>
+            <p:style>
+              <a:lnRef idx="1">
+                <a:schemeClr val="accent1"/>
+              </a:lnRef>
+              <a:fillRef idx="0">
+                <a:schemeClr val="accent1"/>
+              </a:fillRef>
+              <a:effectRef idx="0">
+                <a:schemeClr val="accent1"/>
+              </a:effectRef>
+              <a:fontRef idx="minor">
+                <a:schemeClr val="tx1"/>
+              </a:fontRef>
+            </p:style>
+          </p:cxnSp>
+          <p:cxnSp>
+            <p:nvCxnSpPr>
+              <p:cNvPr id="61" name="Gerader Verbinder 60">
+                <a:extLst>
+                  <a:ext uri="{FF2B5EF4-FFF2-40B4-BE49-F238E27FC236}">
+                    <a16:creationId xmlns:a16="http://schemas.microsoft.com/office/drawing/2014/main" id="{5C7F3251-98BB-4B74-B166-970399FC3A7D}"/>
+                  </a:ext>
+                </a:extLst>
+              </p:cNvPr>
+              <p:cNvCxnSpPr>
+                <a:cxnSpLocks/>
+              </p:cNvCxnSpPr>
+              <p:nvPr/>
+            </p:nvCxnSpPr>
+            <p:spPr>
+              <a:xfrm>
+                <a:off x="7401997" y="2182862"/>
+                <a:ext cx="75460" cy="0"/>
+              </a:xfrm>
+              <a:prstGeom prst="line">
+                <a:avLst/>
+              </a:prstGeom>
+              <a:ln w="12700">
+                <a:solidFill>
+                  <a:schemeClr val="accent1">
+                    <a:lumMod val="75000"/>
+                  </a:schemeClr>
+                </a:solidFill>
+              </a:ln>
+            </p:spPr>
+            <p:style>
+              <a:lnRef idx="1">
+                <a:schemeClr val="accent1"/>
+              </a:lnRef>
+              <a:fillRef idx="0">
+                <a:schemeClr val="accent1"/>
+              </a:fillRef>
+              <a:effectRef idx="0">
+                <a:schemeClr val="accent1"/>
+              </a:effectRef>
+              <a:fontRef idx="minor">
+                <a:schemeClr val="tx1"/>
+              </a:fontRef>
+            </p:style>
+          </p:cxnSp>
+          <p:cxnSp>
+            <p:nvCxnSpPr>
+              <p:cNvPr id="65" name="Gerader Verbinder 64">
+                <a:extLst>
+                  <a:ext uri="{FF2B5EF4-FFF2-40B4-BE49-F238E27FC236}">
+                    <a16:creationId xmlns:a16="http://schemas.microsoft.com/office/drawing/2014/main" id="{DD1FB7AA-E238-4DAD-9B80-FC7697AC832F}"/>
+                  </a:ext>
+                </a:extLst>
+              </p:cNvPr>
+              <p:cNvCxnSpPr>
+                <a:cxnSpLocks/>
+              </p:cNvCxnSpPr>
+              <p:nvPr/>
+            </p:nvCxnSpPr>
+            <p:spPr>
+              <a:xfrm>
+                <a:off x="7208057" y="2182862"/>
+                <a:ext cx="75460" cy="0"/>
+              </a:xfrm>
+              <a:prstGeom prst="line">
+                <a:avLst/>
+              </a:prstGeom>
+              <a:ln w="12700">
+                <a:solidFill>
+                  <a:schemeClr val="accent1">
+                    <a:lumMod val="75000"/>
+                  </a:schemeClr>
+                </a:solidFill>
+              </a:ln>
+            </p:spPr>
+            <p:style>
+              <a:lnRef idx="1">
+                <a:schemeClr val="accent1"/>
+              </a:lnRef>
+              <a:fillRef idx="0">
+                <a:schemeClr val="accent1"/>
+              </a:fillRef>
+              <a:effectRef idx="0">
+                <a:schemeClr val="accent1"/>
+              </a:effectRef>
+              <a:fontRef idx="minor">
+                <a:schemeClr val="tx1"/>
+              </a:fontRef>
+            </p:style>
+          </p:cxnSp>
         </p:grpSp>
-      </p:grpSp>
-      <p:sp>
-        <p:nvSpPr>
-          <p:cNvPr id="12" name="Textfeld 11">
-            <a:extLst>
-              <a:ext uri="{FF2B5EF4-FFF2-40B4-BE49-F238E27FC236}">
-                <a16:creationId xmlns:a16="http://schemas.microsoft.com/office/drawing/2014/main" id="{8FB01143-E2A9-4CF2-A145-4BA537E181B6}"/>
-              </a:ext>
-            </a:extLst>
-          </p:cNvPr>
-          <p:cNvSpPr txBox="1"/>
-          <p:nvPr/>
-        </p:nvSpPr>
-        <p:spPr>
-          <a:xfrm>
-            <a:off x="2032987" y="1352975"/>
-            <a:ext cx="1216240" cy="646331"/>
-          </a:xfrm>
-          <a:prstGeom prst="rect">
-            <a:avLst/>
-          </a:prstGeom>
-          <a:noFill/>
-        </p:spPr>
-        <p:txBody>
-          <a:bodyPr wrap="square" rtlCol="0">
-            <a:spAutoFit/>
-          </a:bodyPr>
-          <a:lstStyle/>
-          <a:p>
-            <a:r>
-              <a:rPr lang="de-DE" dirty="0" err="1"/>
-              <a:t>Product</a:t>
-            </a:r>
-            <a:endParaRPr lang="de-DE" dirty="0"/>
-          </a:p>
-          <a:p>
-            <a:r>
-              <a:rPr lang="de-DE" dirty="0"/>
-              <a:t>Backlog</a:t>
-            </a:r>
-          </a:p>
-        </p:txBody>
-      </p:sp>
-      <p:grpSp>
-        <p:nvGrpSpPr>
-          <p:cNvPr id="13" name="Gruppieren 12">
-            <a:extLst>
-              <a:ext uri="{FF2B5EF4-FFF2-40B4-BE49-F238E27FC236}">
-                <a16:creationId xmlns:a16="http://schemas.microsoft.com/office/drawing/2014/main" id="{0A102D0B-4340-4B2B-85EA-4EAD7EDF1EA7}"/>
-              </a:ext>
-            </a:extLst>
-          </p:cNvPr>
-          <p:cNvGrpSpPr/>
-          <p:nvPr/>
-        </p:nvGrpSpPr>
-        <p:grpSpPr>
-          <a:xfrm>
-            <a:off x="3320250" y="2231993"/>
-            <a:ext cx="905522" cy="960269"/>
-            <a:chOff x="2032987" y="1984159"/>
-            <a:chExt cx="905522" cy="960269"/>
-          </a:xfrm>
-        </p:grpSpPr>
         <p:sp>
           <p:nvSpPr>
-            <p:cNvPr id="14" name="Gleich 13">
+            <p:cNvPr id="56" name="Textfeld 55">
               <a:extLst>
                 <a:ext uri="{FF2B5EF4-FFF2-40B4-BE49-F238E27FC236}">
-                  <a16:creationId xmlns:a16="http://schemas.microsoft.com/office/drawing/2014/main" id="{BAEC0966-239D-4384-A97A-3158C0AA9ECC}"/>
+                  <a16:creationId xmlns:a16="http://schemas.microsoft.com/office/drawing/2014/main" id="{466807A1-DF2B-430C-BB2B-4EF3B9A543E1}"/>
+                </a:ext>
+              </a:extLst>
+            </p:cNvPr>
+            <p:cNvSpPr txBox="1"/>
+            <p:nvPr/>
+          </p:nvSpPr>
+          <p:spPr>
+            <a:xfrm>
+              <a:off x="2517524" y="2478424"/>
+              <a:ext cx="910904" cy="523220"/>
+            </a:xfrm>
+            <a:prstGeom prst="rect">
+              <a:avLst/>
+            </a:prstGeom>
+            <a:noFill/>
+          </p:spPr>
+          <p:txBody>
+            <a:bodyPr wrap="square" rtlCol="0">
+              <a:spAutoFit/>
+            </a:bodyPr>
+            <a:lstStyle/>
+            <a:p>
+              <a:pPr algn="ctr"/>
+              <a:r>
+                <a:rPr lang="de-DE" sz="1400" dirty="0"/>
+                <a:t>Sprint </a:t>
+              </a:r>
+            </a:p>
+            <a:p>
+              <a:pPr algn="ctr"/>
+              <a:r>
+                <a:rPr lang="de-DE" sz="1400" dirty="0" err="1"/>
+                <a:t>Planning</a:t>
+              </a:r>
+              <a:endParaRPr lang="de-DE" sz="1400" dirty="0"/>
+            </a:p>
+          </p:txBody>
+        </p:sp>
+        <p:sp>
+          <p:nvSpPr>
+            <p:cNvPr id="48" name="Textfeld 47">
+              <a:extLst>
+                <a:ext uri="{FF2B5EF4-FFF2-40B4-BE49-F238E27FC236}">
+                  <a16:creationId xmlns:a16="http://schemas.microsoft.com/office/drawing/2014/main" id="{B8A2823A-FBE1-4ACD-B45F-F3DDF397022E}"/>
+                </a:ext>
+              </a:extLst>
+            </p:cNvPr>
+            <p:cNvSpPr txBox="1"/>
+            <p:nvPr/>
+          </p:nvSpPr>
+          <p:spPr>
+            <a:xfrm>
+              <a:off x="5628186" y="2514419"/>
+              <a:ext cx="1216240" cy="584775"/>
+            </a:xfrm>
+            <a:prstGeom prst="rect">
+              <a:avLst/>
+            </a:prstGeom>
+            <a:noFill/>
+          </p:spPr>
+          <p:txBody>
+            <a:bodyPr wrap="square" rtlCol="0">
+              <a:spAutoFit/>
+            </a:bodyPr>
+            <a:lstStyle/>
+            <a:p>
+              <a:pPr algn="ctr"/>
+              <a:r>
+                <a:rPr lang="de-DE" sz="1600" dirty="0"/>
+                <a:t>Sprint</a:t>
+              </a:r>
+            </a:p>
+            <a:p>
+              <a:pPr algn="ctr"/>
+              <a:r>
+                <a:rPr lang="de-DE" sz="1600" dirty="0"/>
+                <a:t>2-4 Wochen</a:t>
+              </a:r>
+            </a:p>
+          </p:txBody>
+        </p:sp>
+        <p:grpSp>
+          <p:nvGrpSpPr>
+            <p:cNvPr id="76" name="Gruppieren 75">
+              <a:extLst>
+                <a:ext uri="{FF2B5EF4-FFF2-40B4-BE49-F238E27FC236}">
+                  <a16:creationId xmlns:a16="http://schemas.microsoft.com/office/drawing/2014/main" id="{DE24F791-A30B-4EE9-B619-11156420FC1D}"/>
+                </a:ext>
+              </a:extLst>
+            </p:cNvPr>
+            <p:cNvGrpSpPr/>
+            <p:nvPr/>
+          </p:nvGrpSpPr>
+          <p:grpSpPr>
+            <a:xfrm>
+              <a:off x="7945674" y="2048976"/>
+              <a:ext cx="2260586" cy="3030982"/>
+              <a:chOff x="7714499" y="1838244"/>
+              <a:chExt cx="2260586" cy="3030982"/>
+            </a:xfrm>
+          </p:grpSpPr>
+          <p:pic>
+            <p:nvPicPr>
+              <p:cNvPr id="24" name="Grafik 23" descr="Kiste">
+                <a:extLst>
+                  <a:ext uri="{FF2B5EF4-FFF2-40B4-BE49-F238E27FC236}">
+                    <a16:creationId xmlns:a16="http://schemas.microsoft.com/office/drawing/2014/main" id="{8A15054C-8A50-49E3-A5A5-20742D9DD852}"/>
+                  </a:ext>
+                </a:extLst>
+              </p:cNvPr>
+              <p:cNvPicPr>
+                <a:picLocks noChangeAspect="1"/>
+              </p:cNvPicPr>
+              <p:nvPr/>
+            </p:nvPicPr>
+            <p:blipFill>
+              <a:blip r:embed="rId4">
+                <a:extLst>
+                  <a:ext uri="{28A0092B-C50C-407E-A947-70E740481C1C}">
+                    <a14:useLocalDpi xmlns:a14="http://schemas.microsoft.com/office/drawing/2010/main" val="0"/>
+                  </a:ext>
+                  <a:ext uri="{96DAC541-7B7A-43D3-8B79-37D633B846F1}">
+                    <asvg:svgBlip xmlns:asvg="http://schemas.microsoft.com/office/drawing/2016/SVG/main" r:embed="rId5"/>
+                  </a:ext>
+                </a:extLst>
+              </a:blip>
+              <a:stretch>
+                <a:fillRect/>
+              </a:stretch>
+            </p:blipFill>
+            <p:spPr>
+              <a:xfrm>
+                <a:off x="7714499" y="2863170"/>
+                <a:ext cx="914400" cy="914400"/>
+              </a:xfrm>
+              <a:prstGeom prst="rect">
+                <a:avLst/>
+              </a:prstGeom>
+            </p:spPr>
+          </p:pic>
+          <p:sp>
+            <p:nvSpPr>
+              <p:cNvPr id="71" name="Textfeld 70">
+                <a:extLst>
+                  <a:ext uri="{FF2B5EF4-FFF2-40B4-BE49-F238E27FC236}">
+                    <a16:creationId xmlns:a16="http://schemas.microsoft.com/office/drawing/2014/main" id="{438D30D2-00E8-41E0-B52B-91BC9C03491E}"/>
+                  </a:ext>
+                </a:extLst>
+              </p:cNvPr>
+              <p:cNvSpPr txBox="1"/>
+              <p:nvPr/>
+            </p:nvSpPr>
+            <p:spPr>
+              <a:xfrm>
+                <a:off x="8777483" y="3105410"/>
+                <a:ext cx="1055861" cy="307777"/>
+              </a:xfrm>
+              <a:prstGeom prst="rect">
+                <a:avLst/>
+              </a:prstGeom>
+              <a:noFill/>
+            </p:spPr>
+            <p:txBody>
+              <a:bodyPr wrap="square" rtlCol="0">
+                <a:spAutoFit/>
+              </a:bodyPr>
+              <a:lstStyle/>
+              <a:p>
+                <a:pPr algn="ctr"/>
+                <a:r>
+                  <a:rPr lang="de-DE" sz="1400" dirty="0"/>
+                  <a:t>Inkrement</a:t>
+                </a:r>
+              </a:p>
+            </p:txBody>
+          </p:sp>
+          <p:grpSp>
+            <p:nvGrpSpPr>
+              <p:cNvPr id="74" name="Gruppieren 73">
+                <a:extLst>
+                  <a:ext uri="{FF2B5EF4-FFF2-40B4-BE49-F238E27FC236}">
+                    <a16:creationId xmlns:a16="http://schemas.microsoft.com/office/drawing/2014/main" id="{6CA786A5-1F0F-4B85-9E21-89E1CFC9628B}"/>
+                  </a:ext>
+                </a:extLst>
+              </p:cNvPr>
+              <p:cNvGrpSpPr/>
+              <p:nvPr/>
+            </p:nvGrpSpPr>
+            <p:grpSpPr>
+              <a:xfrm>
+                <a:off x="7736168" y="1838244"/>
+                <a:ext cx="2084623" cy="914400"/>
+                <a:chOff x="9022535" y="2867473"/>
+                <a:chExt cx="2084623" cy="914400"/>
+              </a:xfrm>
+            </p:grpSpPr>
+            <p:pic>
+              <p:nvPicPr>
+                <p:cNvPr id="19" name="Grafik 18" descr="Theater">
+                  <a:extLst>
+                    <a:ext uri="{FF2B5EF4-FFF2-40B4-BE49-F238E27FC236}">
+                      <a16:creationId xmlns:a16="http://schemas.microsoft.com/office/drawing/2014/main" id="{5694BA7F-9B17-4F9B-9A09-5C72CDCDB049}"/>
+                    </a:ext>
+                  </a:extLst>
+                </p:cNvPr>
+                <p:cNvPicPr>
+                  <a:picLocks noChangeAspect="1"/>
+                </p:cNvPicPr>
+                <p:nvPr/>
+              </p:nvPicPr>
+              <p:blipFill>
+                <a:blip r:embed="rId6">
+                  <a:extLst>
+                    <a:ext uri="{28A0092B-C50C-407E-A947-70E740481C1C}">
+                      <a14:useLocalDpi xmlns:a14="http://schemas.microsoft.com/office/drawing/2010/main" val="0"/>
+                    </a:ext>
+                    <a:ext uri="{96DAC541-7B7A-43D3-8B79-37D633B846F1}">
+                      <asvg:svgBlip xmlns:asvg="http://schemas.microsoft.com/office/drawing/2016/SVG/main" r:embed="rId7"/>
+                    </a:ext>
+                  </a:extLst>
+                </a:blip>
+                <a:stretch>
+                  <a:fillRect/>
+                </a:stretch>
+              </p:blipFill>
+              <p:spPr>
+                <a:xfrm>
+                  <a:off x="9022535" y="2867473"/>
+                  <a:ext cx="914400" cy="914400"/>
+                </a:xfrm>
+                <a:prstGeom prst="rect">
+                  <a:avLst/>
+                </a:prstGeom>
+              </p:spPr>
+            </p:pic>
+            <p:sp>
+              <p:nvSpPr>
+                <p:cNvPr id="72" name="Textfeld 71">
+                  <a:extLst>
+                    <a:ext uri="{FF2B5EF4-FFF2-40B4-BE49-F238E27FC236}">
+                      <a16:creationId xmlns:a16="http://schemas.microsoft.com/office/drawing/2014/main" id="{320DF563-345C-40D4-A3A5-DD9134A6DA01}"/>
+                    </a:ext>
+                  </a:extLst>
+                </p:cNvPr>
+                <p:cNvSpPr txBox="1"/>
+                <p:nvPr/>
+              </p:nvSpPr>
+              <p:spPr>
+                <a:xfrm>
+                  <a:off x="10051297" y="3000552"/>
+                  <a:ext cx="1055861" cy="523220"/>
+                </a:xfrm>
+                <a:prstGeom prst="rect">
+                  <a:avLst/>
+                </a:prstGeom>
+                <a:noFill/>
+              </p:spPr>
+              <p:txBody>
+                <a:bodyPr wrap="square" rtlCol="0">
+                  <a:spAutoFit/>
+                </a:bodyPr>
+                <a:lstStyle/>
+                <a:p>
+                  <a:pPr algn="ctr"/>
+                  <a:r>
+                    <a:rPr lang="de-DE" sz="1400" dirty="0"/>
+                    <a:t>Sprint Review</a:t>
+                  </a:r>
+                </a:p>
+              </p:txBody>
+            </p:sp>
+          </p:grpSp>
+          <p:grpSp>
+            <p:nvGrpSpPr>
+              <p:cNvPr id="75" name="Gruppieren 74">
+                <a:extLst>
+                  <a:ext uri="{FF2B5EF4-FFF2-40B4-BE49-F238E27FC236}">
+                    <a16:creationId xmlns:a16="http://schemas.microsoft.com/office/drawing/2014/main" id="{31CEDFBD-4EF4-43D2-8BEC-3C59D51D2F26}"/>
+                  </a:ext>
+                </a:extLst>
+              </p:cNvPr>
+              <p:cNvGrpSpPr/>
+              <p:nvPr/>
+            </p:nvGrpSpPr>
+            <p:grpSpPr>
+              <a:xfrm>
+                <a:off x="7728417" y="3954826"/>
+                <a:ext cx="2246668" cy="914400"/>
+                <a:chOff x="10323435" y="2872104"/>
+                <a:chExt cx="2246668" cy="914400"/>
+              </a:xfrm>
+            </p:grpSpPr>
+            <p:grpSp>
+              <p:nvGrpSpPr>
+                <p:cNvPr id="69" name="Gruppieren 68">
+                  <a:extLst>
+                    <a:ext uri="{FF2B5EF4-FFF2-40B4-BE49-F238E27FC236}">
+                      <a16:creationId xmlns:a16="http://schemas.microsoft.com/office/drawing/2014/main" id="{40C298A0-A3F0-4065-9A33-A6632858303C}"/>
+                    </a:ext>
+                  </a:extLst>
+                </p:cNvPr>
+                <p:cNvGrpSpPr/>
+                <p:nvPr/>
+              </p:nvGrpSpPr>
+              <p:grpSpPr>
+                <a:xfrm>
+                  <a:off x="10323435" y="2872104"/>
+                  <a:ext cx="914400" cy="914400"/>
+                  <a:chOff x="3640645" y="4673550"/>
+                  <a:chExt cx="1290361" cy="1092450"/>
+                </a:xfrm>
+              </p:grpSpPr>
+              <p:sp>
+                <p:nvSpPr>
+                  <p:cNvPr id="60" name="Gleichschenkliges Dreieck 59">
+                    <a:extLst>
+                      <a:ext uri="{FF2B5EF4-FFF2-40B4-BE49-F238E27FC236}">
+                        <a16:creationId xmlns:a16="http://schemas.microsoft.com/office/drawing/2014/main" id="{C98E0DC0-0F17-4597-BB02-CEBE3A31553C}"/>
+                      </a:ext>
+                    </a:extLst>
+                  </p:cNvPr>
+                  <p:cNvSpPr/>
+                  <p:nvPr/>
+                </p:nvSpPr>
+                <p:spPr>
+                  <a:xfrm>
+                    <a:off x="3754477" y="4857000"/>
+                    <a:ext cx="1050432" cy="729495"/>
+                  </a:xfrm>
+                  <a:prstGeom prst="triangle">
+                    <a:avLst/>
+                  </a:prstGeom>
+                  <a:noFill/>
+                  <a:ln>
+                    <a:solidFill>
+                      <a:schemeClr val="accent1">
+                        <a:lumMod val="75000"/>
+                      </a:schemeClr>
+                    </a:solidFill>
+                  </a:ln>
+                </p:spPr>
+                <p:style>
+                  <a:lnRef idx="2">
+                    <a:schemeClr val="accent1">
+                      <a:shade val="50000"/>
+                    </a:schemeClr>
+                  </a:lnRef>
+                  <a:fillRef idx="1">
+                    <a:schemeClr val="accent1"/>
+                  </a:fillRef>
+                  <a:effectRef idx="0">
+                    <a:schemeClr val="accent1"/>
+                  </a:effectRef>
+                  <a:fontRef idx="minor">
+                    <a:schemeClr val="lt1"/>
+                  </a:fontRef>
+                </p:style>
+                <p:txBody>
+                  <a:bodyPr rtlCol="0" anchor="ctr"/>
+                  <a:lstStyle/>
+                  <a:p>
+                    <a:pPr algn="ctr"/>
+                    <a:endParaRPr lang="de-DE"/>
+                  </a:p>
+                </p:txBody>
+              </p:sp>
+              <p:grpSp>
+                <p:nvGrpSpPr>
+                  <p:cNvPr id="67" name="Gruppieren 66">
+                    <a:extLst>
+                      <a:ext uri="{FF2B5EF4-FFF2-40B4-BE49-F238E27FC236}">
+                        <a16:creationId xmlns:a16="http://schemas.microsoft.com/office/drawing/2014/main" id="{130899DC-4095-46E8-BE0D-D0FFE4969C6F}"/>
+                      </a:ext>
+                    </a:extLst>
+                  </p:cNvPr>
+                  <p:cNvGrpSpPr/>
+                  <p:nvPr/>
+                </p:nvGrpSpPr>
+                <p:grpSpPr>
+                  <a:xfrm>
+                    <a:off x="4039669" y="4673550"/>
+                    <a:ext cx="495300" cy="440280"/>
+                    <a:chOff x="861060" y="4236720"/>
+                    <a:chExt cx="495300" cy="440280"/>
+                  </a:xfrm>
+                </p:grpSpPr>
+                <p:sp>
+                  <p:nvSpPr>
+                    <p:cNvPr id="62" name="Rechteck 61">
+                      <a:extLst>
+                        <a:ext uri="{FF2B5EF4-FFF2-40B4-BE49-F238E27FC236}">
+                          <a16:creationId xmlns:a16="http://schemas.microsoft.com/office/drawing/2014/main" id="{F1330DD8-1ECF-4328-A627-CAA499ABF957}"/>
+                        </a:ext>
+                      </a:extLst>
+                    </p:cNvPr>
+                    <p:cNvSpPr/>
+                    <p:nvPr/>
+                  </p:nvSpPr>
+                  <p:spPr>
+                    <a:xfrm>
+                      <a:off x="861060" y="4236720"/>
+                      <a:ext cx="495300" cy="440280"/>
+                    </a:xfrm>
+                    <a:prstGeom prst="rect">
+                      <a:avLst/>
+                    </a:prstGeom>
+                    <a:solidFill>
+                      <a:schemeClr val="bg1"/>
+                    </a:solidFill>
+                    <a:ln>
+                      <a:solidFill>
+                        <a:schemeClr val="bg1"/>
+                      </a:solidFill>
+                    </a:ln>
+                  </p:spPr>
+                  <p:style>
+                    <a:lnRef idx="2">
+                      <a:schemeClr val="accent1">
+                        <a:shade val="50000"/>
+                      </a:schemeClr>
+                    </a:lnRef>
+                    <a:fillRef idx="1">
+                      <a:schemeClr val="accent1"/>
+                    </a:fillRef>
+                    <a:effectRef idx="0">
+                      <a:schemeClr val="accent1"/>
+                    </a:effectRef>
+                    <a:fontRef idx="minor">
+                      <a:schemeClr val="lt1"/>
+                    </a:fontRef>
+                  </p:style>
+                  <p:txBody>
+                    <a:bodyPr rtlCol="0" anchor="ctr"/>
+                    <a:lstStyle/>
+                    <a:p>
+                      <a:pPr algn="ctr"/>
+                      <a:endParaRPr lang="de-DE"/>
+                    </a:p>
+                  </p:txBody>
+                </p:sp>
+                <p:pic>
+                  <p:nvPicPr>
+                    <p:cNvPr id="53" name="Grafik 52" descr="Zielgruppe">
+                      <a:extLst>
+                        <a:ext uri="{FF2B5EF4-FFF2-40B4-BE49-F238E27FC236}">
+                          <a16:creationId xmlns:a16="http://schemas.microsoft.com/office/drawing/2014/main" id="{06716B6D-8635-4540-ACA6-6E379BAFA0D2}"/>
+                        </a:ext>
+                      </a:extLst>
+                    </p:cNvPr>
+                    <p:cNvPicPr>
+                      <a:picLocks noChangeAspect="1"/>
+                    </p:cNvPicPr>
+                    <p:nvPr/>
+                  </p:nvPicPr>
+                  <p:blipFill>
+                    <a:blip r:embed="rId8">
+                      <a:extLst>
+                        <a:ext uri="{28A0092B-C50C-407E-A947-70E740481C1C}">
+                          <a14:useLocalDpi xmlns:a14="http://schemas.microsoft.com/office/drawing/2010/main" val="0"/>
+                        </a:ext>
+                        <a:ext uri="{96DAC541-7B7A-43D3-8B79-37D633B846F1}">
+                          <asvg:svgBlip xmlns:asvg="http://schemas.microsoft.com/office/drawing/2016/SVG/main" r:embed="rId9"/>
+                        </a:ext>
+                      </a:extLst>
+                    </a:blip>
+                    <a:stretch>
+                      <a:fillRect/>
+                    </a:stretch>
+                  </p:blipFill>
+                  <p:spPr>
+                    <a:xfrm>
+                      <a:off x="928710" y="4276860"/>
+                      <a:ext cx="360000" cy="360000"/>
+                    </a:xfrm>
+                    <a:prstGeom prst="rect">
+                      <a:avLst/>
+                    </a:prstGeom>
+                  </p:spPr>
+                </p:pic>
+              </p:grpSp>
+              <p:grpSp>
+                <p:nvGrpSpPr>
+                  <p:cNvPr id="63" name="Gruppieren 62">
+                    <a:extLst>
+                      <a:ext uri="{FF2B5EF4-FFF2-40B4-BE49-F238E27FC236}">
+                        <a16:creationId xmlns:a16="http://schemas.microsoft.com/office/drawing/2014/main" id="{0761EC92-1DB9-46DD-B959-5FAC5E254EFE}"/>
+                      </a:ext>
+                    </a:extLst>
+                  </p:cNvPr>
+                  <p:cNvGrpSpPr/>
+                  <p:nvPr/>
+                </p:nvGrpSpPr>
+                <p:grpSpPr>
+                  <a:xfrm>
+                    <a:off x="3640645" y="5325720"/>
+                    <a:ext cx="495300" cy="440280"/>
+                    <a:chOff x="1831724" y="4881240"/>
+                    <a:chExt cx="495300" cy="440280"/>
+                  </a:xfrm>
+                </p:grpSpPr>
+                <p:sp>
+                  <p:nvSpPr>
+                    <p:cNvPr id="66" name="Rechteck 65">
+                      <a:extLst>
+                        <a:ext uri="{FF2B5EF4-FFF2-40B4-BE49-F238E27FC236}">
+                          <a16:creationId xmlns:a16="http://schemas.microsoft.com/office/drawing/2014/main" id="{5A1B52AB-7425-4F59-8BB4-E2087A506837}"/>
+                        </a:ext>
+                      </a:extLst>
+                    </p:cNvPr>
+                    <p:cNvSpPr/>
+                    <p:nvPr/>
+                  </p:nvSpPr>
+                  <p:spPr>
+                    <a:xfrm>
+                      <a:off x="1831724" y="4881240"/>
+                      <a:ext cx="495300" cy="440280"/>
+                    </a:xfrm>
+                    <a:prstGeom prst="rect">
+                      <a:avLst/>
+                    </a:prstGeom>
+                    <a:solidFill>
+                      <a:schemeClr val="bg1"/>
+                    </a:solidFill>
+                    <a:ln>
+                      <a:noFill/>
+                    </a:ln>
+                  </p:spPr>
+                  <p:style>
+                    <a:lnRef idx="2">
+                      <a:schemeClr val="accent1">
+                        <a:shade val="50000"/>
+                      </a:schemeClr>
+                    </a:lnRef>
+                    <a:fillRef idx="1">
+                      <a:schemeClr val="accent1"/>
+                    </a:fillRef>
+                    <a:effectRef idx="0">
+                      <a:schemeClr val="accent1"/>
+                    </a:effectRef>
+                    <a:fontRef idx="minor">
+                      <a:schemeClr val="lt1"/>
+                    </a:fontRef>
+                  </p:style>
+                  <p:txBody>
+                    <a:bodyPr rtlCol="0" anchor="ctr"/>
+                    <a:lstStyle/>
+                    <a:p>
+                      <a:pPr algn="ctr"/>
+                      <a:endParaRPr lang="de-DE" dirty="0"/>
+                    </a:p>
+                  </p:txBody>
+                </p:sp>
+                <p:pic>
+                  <p:nvPicPr>
+                    <p:cNvPr id="57" name="Grafik 56" descr="Gruppenbrainstorming">
+                      <a:extLst>
+                        <a:ext uri="{FF2B5EF4-FFF2-40B4-BE49-F238E27FC236}">
+                          <a16:creationId xmlns:a16="http://schemas.microsoft.com/office/drawing/2014/main" id="{A250788A-92A4-4E3A-995F-C93C77634480}"/>
+                        </a:ext>
+                      </a:extLst>
+                    </p:cNvPr>
+                    <p:cNvPicPr>
+                      <a:picLocks noChangeAspect="1"/>
+                    </p:cNvPicPr>
+                    <p:nvPr/>
+                  </p:nvPicPr>
+                  <p:blipFill>
+                    <a:blip r:embed="rId10">
+                      <a:extLst>
+                        <a:ext uri="{28A0092B-C50C-407E-A947-70E740481C1C}">
+                          <a14:useLocalDpi xmlns:a14="http://schemas.microsoft.com/office/drawing/2010/main" val="0"/>
+                        </a:ext>
+                        <a:ext uri="{96DAC541-7B7A-43D3-8B79-37D633B846F1}">
+                          <asvg:svgBlip xmlns:asvg="http://schemas.microsoft.com/office/drawing/2016/SVG/main" r:embed="rId11"/>
+                        </a:ext>
+                      </a:extLst>
+                    </a:blip>
+                    <a:stretch>
+                      <a:fillRect/>
+                    </a:stretch>
+                  </p:blipFill>
+                  <p:spPr>
+                    <a:xfrm>
+                      <a:off x="1895134" y="4912380"/>
+                      <a:ext cx="360000" cy="360000"/>
+                    </a:xfrm>
+                    <a:prstGeom prst="rect">
+                      <a:avLst/>
+                    </a:prstGeom>
+                  </p:spPr>
+                </p:pic>
+              </p:grpSp>
+              <p:grpSp>
+                <p:nvGrpSpPr>
+                  <p:cNvPr id="68" name="Gruppieren 67">
+                    <a:extLst>
+                      <a:ext uri="{FF2B5EF4-FFF2-40B4-BE49-F238E27FC236}">
+                        <a16:creationId xmlns:a16="http://schemas.microsoft.com/office/drawing/2014/main" id="{CBE86DD1-844A-4427-9649-BFE432BB34BD}"/>
+                      </a:ext>
+                    </a:extLst>
+                  </p:cNvPr>
+                  <p:cNvGrpSpPr/>
+                  <p:nvPr/>
+                </p:nvGrpSpPr>
+                <p:grpSpPr>
+                  <a:xfrm>
+                    <a:off x="4435706" y="5321175"/>
+                    <a:ext cx="495300" cy="440280"/>
+                    <a:chOff x="861060" y="4857000"/>
+                    <a:chExt cx="495300" cy="440280"/>
+                  </a:xfrm>
+                </p:grpSpPr>
+                <p:sp>
+                  <p:nvSpPr>
+                    <p:cNvPr id="64" name="Rechteck 63">
+                      <a:extLst>
+                        <a:ext uri="{FF2B5EF4-FFF2-40B4-BE49-F238E27FC236}">
+                          <a16:creationId xmlns:a16="http://schemas.microsoft.com/office/drawing/2014/main" id="{428C463C-2127-4E20-968B-5B4DD24E5E95}"/>
+                        </a:ext>
+                      </a:extLst>
+                    </p:cNvPr>
+                    <p:cNvSpPr/>
+                    <p:nvPr/>
+                  </p:nvSpPr>
+                  <p:spPr>
+                    <a:xfrm>
+                      <a:off x="861060" y="4857000"/>
+                      <a:ext cx="495300" cy="440280"/>
+                    </a:xfrm>
+                    <a:prstGeom prst="rect">
+                      <a:avLst/>
+                    </a:prstGeom>
+                    <a:solidFill>
+                      <a:schemeClr val="bg1"/>
+                    </a:solidFill>
+                    <a:ln>
+                      <a:noFill/>
+                    </a:ln>
+                  </p:spPr>
+                  <p:style>
+                    <a:lnRef idx="2">
+                      <a:schemeClr val="accent1">
+                        <a:shade val="50000"/>
+                      </a:schemeClr>
+                    </a:lnRef>
+                    <a:fillRef idx="1">
+                      <a:schemeClr val="accent1"/>
+                    </a:fillRef>
+                    <a:effectRef idx="0">
+                      <a:schemeClr val="accent1"/>
+                    </a:effectRef>
+                    <a:fontRef idx="minor">
+                      <a:schemeClr val="lt1"/>
+                    </a:fontRef>
+                  </p:style>
+                  <p:txBody>
+                    <a:bodyPr rtlCol="0" anchor="ctr"/>
+                    <a:lstStyle/>
+                    <a:p>
+                      <a:pPr algn="ctr"/>
+                      <a:endParaRPr lang="de-DE"/>
+                    </a:p>
+                  </p:txBody>
+                </p:sp>
+                <p:pic>
+                  <p:nvPicPr>
+                    <p:cNvPr id="59" name="Grafik 58" descr="Geschäftswachstum">
+                      <a:extLst>
+                        <a:ext uri="{FF2B5EF4-FFF2-40B4-BE49-F238E27FC236}">
+                          <a16:creationId xmlns:a16="http://schemas.microsoft.com/office/drawing/2014/main" id="{0E079776-48C0-4A92-95B8-6E4C4F11F18B}"/>
+                        </a:ext>
+                      </a:extLst>
+                    </p:cNvPr>
+                    <p:cNvPicPr>
+                      <a:picLocks noChangeAspect="1"/>
+                    </p:cNvPicPr>
+                    <p:nvPr/>
+                  </p:nvPicPr>
+                  <p:blipFill>
+                    <a:blip r:embed="rId12">
+                      <a:extLst>
+                        <a:ext uri="{28A0092B-C50C-407E-A947-70E740481C1C}">
+                          <a14:useLocalDpi xmlns:a14="http://schemas.microsoft.com/office/drawing/2010/main" val="0"/>
+                        </a:ext>
+                        <a:ext uri="{96DAC541-7B7A-43D3-8B79-37D633B846F1}">
+                          <asvg:svgBlip xmlns:asvg="http://schemas.microsoft.com/office/drawing/2016/SVG/main" r:embed="rId13"/>
+                        </a:ext>
+                      </a:extLst>
+                    </a:blip>
+                    <a:stretch>
+                      <a:fillRect/>
+                    </a:stretch>
+                  </p:blipFill>
+                  <p:spPr>
+                    <a:xfrm>
+                      <a:off x="928710" y="4897140"/>
+                      <a:ext cx="360000" cy="360000"/>
+                    </a:xfrm>
+                    <a:prstGeom prst="rect">
+                      <a:avLst/>
+                    </a:prstGeom>
+                  </p:spPr>
+                </p:pic>
+              </p:grpSp>
+            </p:grpSp>
+            <p:sp>
+              <p:nvSpPr>
+                <p:cNvPr id="73" name="Textfeld 72">
+                  <a:extLst>
+                    <a:ext uri="{FF2B5EF4-FFF2-40B4-BE49-F238E27FC236}">
+                      <a16:creationId xmlns:a16="http://schemas.microsoft.com/office/drawing/2014/main" id="{1766B275-508B-4FCC-B1D3-76DB43D970E4}"/>
+                    </a:ext>
+                  </a:extLst>
+                </p:cNvPr>
+                <p:cNvSpPr txBox="1"/>
+                <p:nvPr/>
+              </p:nvSpPr>
+              <p:spPr>
+                <a:xfrm>
+                  <a:off x="11245586" y="3062836"/>
+                  <a:ext cx="1324517" cy="523220"/>
+                </a:xfrm>
+                <a:prstGeom prst="rect">
+                  <a:avLst/>
+                </a:prstGeom>
+                <a:noFill/>
+              </p:spPr>
+              <p:txBody>
+                <a:bodyPr wrap="square" rtlCol="0">
+                  <a:spAutoFit/>
+                </a:bodyPr>
+                <a:lstStyle/>
+                <a:p>
+                  <a:pPr algn="ctr"/>
+                  <a:r>
+                    <a:rPr lang="de-DE" sz="1400" dirty="0"/>
+                    <a:t>Sprint </a:t>
+                  </a:r>
+                  <a:r>
+                    <a:rPr lang="de-DE" sz="1400" dirty="0" err="1"/>
+                    <a:t>Retrospective</a:t>
+                  </a:r>
+                  <a:endParaRPr lang="de-DE" sz="1400" dirty="0"/>
+                </a:p>
+              </p:txBody>
+            </p:sp>
+          </p:grpSp>
+        </p:grpSp>
+        <p:sp>
+          <p:nvSpPr>
+            <p:cNvPr id="83" name="Pfeil: gebogen 82">
+              <a:extLst>
+                <a:ext uri="{FF2B5EF4-FFF2-40B4-BE49-F238E27FC236}">
+                  <a16:creationId xmlns:a16="http://schemas.microsoft.com/office/drawing/2014/main" id="{47B65F07-5E6B-45FB-AA3D-F440FAE4C69C}"/>
                 </a:ext>
               </a:extLst>
             </p:cNvPr>
@@ -4552,11 +6746,11 @@
             <p:nvPr/>
           </p:nvSpPr>
           <p:spPr>
-            <a:xfrm>
-              <a:off x="2032987" y="1984159"/>
-              <a:ext cx="905522" cy="559293"/>
+            <a:xfrm rot="16200000">
+              <a:off x="4819551" y="1686545"/>
+              <a:ext cx="967601" cy="5074565"/>
             </a:xfrm>
-            <a:prstGeom prst="mathEqual">
+            <a:prstGeom prst="bentArrow">
               <a:avLst/>
             </a:prstGeom>
             <a:solidFill>
@@ -4565,6 +6759,13 @@
                 <a:lumOff val="40000"/>
               </a:schemeClr>
             </a:solidFill>
+            <a:ln>
+              <a:solidFill>
+                <a:schemeClr val="accent1">
+                  <a:lumMod val="75000"/>
+                </a:schemeClr>
+              </a:solidFill>
+            </a:ln>
           </p:spPr>
           <p:style>
             <a:lnRef idx="2">
@@ -4597,10 +6798,90 @@
         </p:sp>
         <p:sp>
           <p:nvSpPr>
-            <p:cNvPr id="15" name="Gleich 14">
+            <p:cNvPr id="85" name="Textfeld 84">
               <a:extLst>
                 <a:ext uri="{FF2B5EF4-FFF2-40B4-BE49-F238E27FC236}">
-                  <a16:creationId xmlns:a16="http://schemas.microsoft.com/office/drawing/2014/main" id="{5B69CE6F-888D-4D7A-945C-0B7CE84015AD}"/>
+                  <a16:creationId xmlns:a16="http://schemas.microsoft.com/office/drawing/2014/main" id="{3C7FF1E7-4E90-45E7-9CDA-D885837458EF}"/>
+                </a:ext>
+              </a:extLst>
+            </p:cNvPr>
+            <p:cNvSpPr txBox="1"/>
+            <p:nvPr/>
+          </p:nvSpPr>
+          <p:spPr>
+            <a:xfrm>
+              <a:off x="4044436" y="991825"/>
+              <a:ext cx="2230254" cy="307777"/>
+            </a:xfrm>
+            <a:prstGeom prst="rect">
+              <a:avLst/>
+            </a:prstGeom>
+            <a:noFill/>
+          </p:spPr>
+          <p:txBody>
+            <a:bodyPr wrap="square" rtlCol="0">
+              <a:spAutoFit/>
+            </a:bodyPr>
+            <a:lstStyle/>
+            <a:p>
+              <a:pPr algn="ctr"/>
+              <a:r>
+                <a:rPr lang="de-DE" sz="1400" dirty="0">
+                  <a:solidFill>
+                    <a:schemeClr val="bg1"/>
+                  </a:solidFill>
+                </a:rPr>
+                <a:t>Produktverbesserungen</a:t>
+              </a:r>
+            </a:p>
+          </p:txBody>
+        </p:sp>
+        <p:sp>
+          <p:nvSpPr>
+            <p:cNvPr id="86" name="Textfeld 85">
+              <a:extLst>
+                <a:ext uri="{FF2B5EF4-FFF2-40B4-BE49-F238E27FC236}">
+                  <a16:creationId xmlns:a16="http://schemas.microsoft.com/office/drawing/2014/main" id="{B012A683-2E66-4AA1-9786-D6F566CBCD03}"/>
+                </a:ext>
+              </a:extLst>
+            </p:cNvPr>
+            <p:cNvSpPr txBox="1"/>
+            <p:nvPr/>
+          </p:nvSpPr>
+          <p:spPr>
+            <a:xfrm>
+              <a:off x="4094346" y="4420190"/>
+              <a:ext cx="2230254" cy="307777"/>
+            </a:xfrm>
+            <a:prstGeom prst="rect">
+              <a:avLst/>
+            </a:prstGeom>
+            <a:noFill/>
+          </p:spPr>
+          <p:txBody>
+            <a:bodyPr wrap="square" rtlCol="0">
+              <a:spAutoFit/>
+            </a:bodyPr>
+            <a:lstStyle/>
+            <a:p>
+              <a:pPr algn="ctr"/>
+              <a:r>
+                <a:rPr lang="de-DE" sz="1400" dirty="0">
+                  <a:solidFill>
+                    <a:schemeClr val="bg1"/>
+                  </a:solidFill>
+                </a:rPr>
+                <a:t>Prozessverbesserungen</a:t>
+              </a:r>
+            </a:p>
+          </p:txBody>
+        </p:sp>
+        <p:sp>
+          <p:nvSpPr>
+            <p:cNvPr id="87" name="Rechteck: abgerundete Ecken 86">
+              <a:extLst>
+                <a:ext uri="{FF2B5EF4-FFF2-40B4-BE49-F238E27FC236}">
+                  <a16:creationId xmlns:a16="http://schemas.microsoft.com/office/drawing/2014/main" id="{166F6EB3-2EFE-4C78-8D67-7AD9F6DE1481}"/>
                 </a:ext>
               </a:extLst>
             </p:cNvPr>
@@ -4609,18 +6890,13 @@
           </p:nvSpPr>
           <p:spPr>
             <a:xfrm>
-              <a:off x="2032987" y="2385135"/>
-              <a:ext cx="905522" cy="559293"/>
+              <a:off x="7840633" y="1956239"/>
+              <a:ext cx="2320612" cy="3240599"/>
             </a:xfrm>
-            <a:prstGeom prst="mathEqual">
+            <a:prstGeom prst="roundRect">
               <a:avLst/>
             </a:prstGeom>
-            <a:solidFill>
-              <a:schemeClr val="tx2">
-                <a:lumMod val="60000"/>
-                <a:lumOff val="40000"/>
-              </a:schemeClr>
-            </a:solidFill>
+            <a:noFill/>
           </p:spPr>
           <p:style>
             <a:lnRef idx="2">
@@ -4643,877 +6919,181 @@
             <a:lstStyle/>
             <a:p>
               <a:pPr algn="ctr"/>
-              <a:endParaRPr lang="de-DE">
-                <a:solidFill>
-                  <a:schemeClr val="tx1"/>
-                </a:solidFill>
-              </a:endParaRPr>
+              <a:endParaRPr lang="de-DE"/>
             </a:p>
           </p:txBody>
         </p:sp>
-      </p:grpSp>
-      <p:sp>
-        <p:nvSpPr>
-          <p:cNvPr id="16" name="Textfeld 15">
-            <a:extLst>
-              <a:ext uri="{FF2B5EF4-FFF2-40B4-BE49-F238E27FC236}">
-                <a16:creationId xmlns:a16="http://schemas.microsoft.com/office/drawing/2014/main" id="{A8E15230-E56B-4CF5-9CF7-9D13D0319859}"/>
-              </a:ext>
-            </a:extLst>
-          </p:cNvPr>
-          <p:cNvSpPr txBox="1"/>
-          <p:nvPr/>
-        </p:nvSpPr>
-        <p:spPr>
-          <a:xfrm>
-            <a:off x="3320250" y="1385174"/>
-            <a:ext cx="1216240" cy="646331"/>
-          </a:xfrm>
-          <a:prstGeom prst="rect">
-            <a:avLst/>
-          </a:prstGeom>
-          <a:noFill/>
-        </p:spPr>
-        <p:txBody>
-          <a:bodyPr wrap="square" rtlCol="0">
-            <a:spAutoFit/>
-          </a:bodyPr>
-          <a:lstStyle/>
-          <a:p>
-            <a:r>
-              <a:rPr lang="de-DE" dirty="0"/>
-              <a:t>Sprint</a:t>
-            </a:r>
-          </a:p>
-          <a:p>
-            <a:r>
-              <a:rPr lang="de-DE" dirty="0"/>
-              <a:t>Backlog</a:t>
-            </a:r>
-          </a:p>
-        </p:txBody>
-      </p:sp>
-      <p:sp>
-        <p:nvSpPr>
-          <p:cNvPr id="21" name="Ellipse 20">
-            <a:extLst>
-              <a:ext uri="{FF2B5EF4-FFF2-40B4-BE49-F238E27FC236}">
-                <a16:creationId xmlns:a16="http://schemas.microsoft.com/office/drawing/2014/main" id="{5198C066-1DD8-4B4B-A41C-8188DA0A8D74}"/>
-              </a:ext>
-            </a:extLst>
-          </p:cNvPr>
-          <p:cNvSpPr/>
-          <p:nvPr/>
-        </p:nvSpPr>
-        <p:spPr>
-          <a:xfrm>
-            <a:off x="5495278" y="2031505"/>
-            <a:ext cx="1864310" cy="1590584"/>
-          </a:xfrm>
-          <a:prstGeom prst="ellipse">
-            <a:avLst/>
-          </a:prstGeom>
-          <a:solidFill>
-            <a:schemeClr val="tx2">
-              <a:lumMod val="60000"/>
-              <a:lumOff val="40000"/>
-            </a:schemeClr>
-          </a:solidFill>
-        </p:spPr>
-        <p:style>
-          <a:lnRef idx="2">
-            <a:schemeClr val="accent1">
-              <a:shade val="50000"/>
-            </a:schemeClr>
-          </a:lnRef>
-          <a:fillRef idx="1">
-            <a:schemeClr val="accent1"/>
-          </a:fillRef>
-          <a:effectRef idx="0">
-            <a:schemeClr val="accent1"/>
-          </a:effectRef>
-          <a:fontRef idx="minor">
-            <a:schemeClr val="lt1"/>
-          </a:fontRef>
-        </p:style>
-        <p:txBody>
-          <a:bodyPr rtlCol="0" anchor="ctr"/>
-          <a:lstStyle/>
-          <a:p>
-            <a:pPr algn="ctr"/>
-            <a:endParaRPr lang="de-DE"/>
-          </a:p>
-        </p:txBody>
-      </p:sp>
-      <p:sp>
-        <p:nvSpPr>
-          <p:cNvPr id="22" name="Ellipse 21">
-            <a:extLst>
-              <a:ext uri="{FF2B5EF4-FFF2-40B4-BE49-F238E27FC236}">
-                <a16:creationId xmlns:a16="http://schemas.microsoft.com/office/drawing/2014/main" id="{812E83A4-01AE-443E-B316-37D333E16031}"/>
-              </a:ext>
-            </a:extLst>
-          </p:cNvPr>
-          <p:cNvSpPr/>
-          <p:nvPr/>
-        </p:nvSpPr>
-        <p:spPr>
-          <a:xfrm>
-            <a:off x="5860001" y="2376994"/>
-            <a:ext cx="1134863" cy="852258"/>
-          </a:xfrm>
-          <a:prstGeom prst="ellipse">
-            <a:avLst/>
-          </a:prstGeom>
-          <a:solidFill>
-            <a:schemeClr val="bg1">
-              <a:lumMod val="95000"/>
-            </a:schemeClr>
-          </a:solidFill>
-        </p:spPr>
-        <p:style>
-          <a:lnRef idx="2">
-            <a:schemeClr val="accent1">
-              <a:shade val="50000"/>
-            </a:schemeClr>
-          </a:lnRef>
-          <a:fillRef idx="1">
-            <a:schemeClr val="accent1"/>
-          </a:fillRef>
-          <a:effectRef idx="0">
-            <a:schemeClr val="accent1"/>
-          </a:effectRef>
-          <a:fontRef idx="minor">
-            <a:schemeClr val="lt1"/>
-          </a:fontRef>
-        </p:style>
-        <p:txBody>
-          <a:bodyPr rtlCol="0" anchor="ctr"/>
-          <a:lstStyle/>
-          <a:p>
-            <a:pPr algn="ctr"/>
-            <a:endParaRPr lang="de-DE"/>
-          </a:p>
-        </p:txBody>
-      </p:sp>
-      <p:sp>
-        <p:nvSpPr>
-          <p:cNvPr id="23" name="Pfeil: nach rechts 22">
-            <a:extLst>
-              <a:ext uri="{FF2B5EF4-FFF2-40B4-BE49-F238E27FC236}">
-                <a16:creationId xmlns:a16="http://schemas.microsoft.com/office/drawing/2014/main" id="{3F8C877B-0ED5-4520-869B-F0E828EDB984}"/>
-              </a:ext>
-            </a:extLst>
-          </p:cNvPr>
-          <p:cNvSpPr/>
-          <p:nvPr/>
-        </p:nvSpPr>
-        <p:spPr>
-          <a:xfrm>
-            <a:off x="6427432" y="3037856"/>
-            <a:ext cx="1367160" cy="764524"/>
-          </a:xfrm>
-          <a:prstGeom prst="rightArrow">
-            <a:avLst/>
-          </a:prstGeom>
-          <a:solidFill>
-            <a:schemeClr val="tx2">
-              <a:lumMod val="60000"/>
-              <a:lumOff val="40000"/>
-            </a:schemeClr>
-          </a:solidFill>
-          <a:ln>
+        <p:sp>
+          <p:nvSpPr>
+            <p:cNvPr id="90" name="Pfeil: gebogen 89">
+              <a:extLst>
+                <a:ext uri="{FF2B5EF4-FFF2-40B4-BE49-F238E27FC236}">
+                  <a16:creationId xmlns:a16="http://schemas.microsoft.com/office/drawing/2014/main" id="{798DEFAF-6293-409A-8B67-F2F6F0A7A0D9}"/>
+                </a:ext>
+              </a:extLst>
+            </p:cNvPr>
+            <p:cNvSpPr/>
+            <p:nvPr/>
+          </p:nvSpPr>
+          <p:spPr>
+            <a:xfrm flipH="1">
+              <a:off x="3380561" y="973519"/>
+              <a:ext cx="5758110" cy="983197"/>
+            </a:xfrm>
+            <a:prstGeom prst="bentArrow">
+              <a:avLst/>
+            </a:prstGeom>
             <a:solidFill>
               <a:schemeClr val="tx2">
                 <a:lumMod val="60000"/>
                 <a:lumOff val="40000"/>
               </a:schemeClr>
             </a:solidFill>
-          </a:ln>
-        </p:spPr>
-        <p:style>
-          <a:lnRef idx="2">
-            <a:schemeClr val="accent1">
-              <a:shade val="50000"/>
-            </a:schemeClr>
-          </a:lnRef>
-          <a:fillRef idx="1">
-            <a:schemeClr val="accent1"/>
-          </a:fillRef>
-          <a:effectRef idx="0">
-            <a:schemeClr val="accent1"/>
-          </a:effectRef>
-          <a:fontRef idx="minor">
-            <a:schemeClr val="lt1"/>
-          </a:fontRef>
-        </p:style>
-        <p:txBody>
-          <a:bodyPr rtlCol="0" anchor="ctr"/>
-          <a:lstStyle/>
-          <a:p>
-            <a:pPr algn="ctr"/>
-            <a:endParaRPr lang="de-DE"/>
-          </a:p>
-        </p:txBody>
-      </p:sp>
-      <p:cxnSp>
-        <p:nvCxnSpPr>
-          <p:cNvPr id="25" name="Gerader Verbinder 24">
-            <a:extLst>
-              <a:ext uri="{FF2B5EF4-FFF2-40B4-BE49-F238E27FC236}">
-                <a16:creationId xmlns:a16="http://schemas.microsoft.com/office/drawing/2014/main" id="{3A79BDAE-3F04-4623-BAF5-5FAD5C0B7DF6}"/>
-              </a:ext>
-            </a:extLst>
-          </p:cNvPr>
-          <p:cNvCxnSpPr>
-            <a:cxnSpLocks/>
-          </p:cNvCxnSpPr>
-          <p:nvPr/>
-        </p:nvCxnSpPr>
-        <p:spPr>
-          <a:xfrm>
-            <a:off x="6422352" y="3622089"/>
-            <a:ext cx="994448" cy="0"/>
-          </a:xfrm>
-          <a:prstGeom prst="line">
-            <a:avLst/>
-          </a:prstGeom>
-          <a:ln w="12700">
-            <a:solidFill>
-              <a:schemeClr val="accent1">
-                <a:lumMod val="75000"/>
-              </a:schemeClr>
-            </a:solidFill>
-          </a:ln>
-        </p:spPr>
-        <p:style>
-          <a:lnRef idx="1">
-            <a:schemeClr val="accent1"/>
-          </a:lnRef>
-          <a:fillRef idx="0">
-            <a:schemeClr val="accent1"/>
-          </a:fillRef>
-          <a:effectRef idx="0">
-            <a:schemeClr val="accent1"/>
-          </a:effectRef>
-          <a:fontRef idx="minor">
-            <a:schemeClr val="tx1"/>
-          </a:fontRef>
-        </p:style>
-      </p:cxnSp>
-      <p:cxnSp>
-        <p:nvCxnSpPr>
-          <p:cNvPr id="27" name="Gerader Verbinder 26">
-            <a:extLst>
-              <a:ext uri="{FF2B5EF4-FFF2-40B4-BE49-F238E27FC236}">
-                <a16:creationId xmlns:a16="http://schemas.microsoft.com/office/drawing/2014/main" id="{0008703D-4744-47BC-97E8-E442A27654CA}"/>
-              </a:ext>
-            </a:extLst>
-          </p:cNvPr>
-          <p:cNvCxnSpPr>
-            <a:cxnSpLocks/>
-          </p:cNvCxnSpPr>
-          <p:nvPr/>
-        </p:nvCxnSpPr>
-        <p:spPr>
-          <a:xfrm flipV="1">
-            <a:off x="6420447" y="3229252"/>
-            <a:ext cx="989368" cy="407"/>
-          </a:xfrm>
-          <a:prstGeom prst="line">
-            <a:avLst/>
-          </a:prstGeom>
-          <a:ln w="12700">
-            <a:solidFill>
-              <a:schemeClr val="accent1">
-                <a:lumMod val="75000"/>
-              </a:schemeClr>
-            </a:solidFill>
-          </a:ln>
-        </p:spPr>
-        <p:style>
-          <a:lnRef idx="1">
-            <a:schemeClr val="accent1"/>
-          </a:lnRef>
-          <a:fillRef idx="0">
-            <a:schemeClr val="accent1"/>
-          </a:fillRef>
-          <a:effectRef idx="0">
-            <a:schemeClr val="accent1"/>
-          </a:effectRef>
-          <a:fontRef idx="minor">
-            <a:schemeClr val="tx1"/>
-          </a:fontRef>
-        </p:style>
-      </p:cxnSp>
-      <p:cxnSp>
-        <p:nvCxnSpPr>
-          <p:cNvPr id="29" name="Gerader Verbinder 28">
-            <a:extLst>
-              <a:ext uri="{FF2B5EF4-FFF2-40B4-BE49-F238E27FC236}">
-                <a16:creationId xmlns:a16="http://schemas.microsoft.com/office/drawing/2014/main" id="{084A057A-79BF-4B88-A8FC-ECD8CCF89ADE}"/>
-              </a:ext>
-            </a:extLst>
-          </p:cNvPr>
-          <p:cNvCxnSpPr>
-            <a:cxnSpLocks/>
-            <a:endCxn id="23" idx="2"/>
-          </p:cNvCxnSpPr>
-          <p:nvPr/>
-        </p:nvCxnSpPr>
-        <p:spPr>
-          <a:xfrm>
-            <a:off x="7411720" y="3622089"/>
-            <a:ext cx="610" cy="180291"/>
-          </a:xfrm>
-          <a:prstGeom prst="line">
-            <a:avLst/>
-          </a:prstGeom>
-          <a:ln w="9525">
-            <a:solidFill>
-              <a:schemeClr val="accent1">
-                <a:lumMod val="75000"/>
-              </a:schemeClr>
-            </a:solidFill>
-          </a:ln>
-        </p:spPr>
-        <p:style>
-          <a:lnRef idx="1">
-            <a:schemeClr val="accent1"/>
-          </a:lnRef>
-          <a:fillRef idx="0">
-            <a:schemeClr val="accent1"/>
-          </a:fillRef>
-          <a:effectRef idx="0">
-            <a:schemeClr val="accent1"/>
-          </a:effectRef>
-          <a:fontRef idx="minor">
-            <a:schemeClr val="tx1"/>
-          </a:fontRef>
-        </p:style>
-      </p:cxnSp>
-      <p:cxnSp>
-        <p:nvCxnSpPr>
-          <p:cNvPr id="32" name="Gerader Verbinder 31">
-            <a:extLst>
-              <a:ext uri="{FF2B5EF4-FFF2-40B4-BE49-F238E27FC236}">
-                <a16:creationId xmlns:a16="http://schemas.microsoft.com/office/drawing/2014/main" id="{156EA9CC-B5B8-4AA7-AC37-52822B076A00}"/>
-              </a:ext>
-            </a:extLst>
-          </p:cNvPr>
-          <p:cNvCxnSpPr>
-            <a:cxnSpLocks/>
-          </p:cNvCxnSpPr>
-          <p:nvPr/>
-        </p:nvCxnSpPr>
-        <p:spPr>
-          <a:xfrm>
-            <a:off x="7412330" y="3040396"/>
-            <a:ext cx="0" cy="191396"/>
-          </a:xfrm>
-          <a:prstGeom prst="line">
-            <a:avLst/>
-          </a:prstGeom>
-          <a:ln w="9525">
-            <a:solidFill>
-              <a:schemeClr val="accent1">
-                <a:lumMod val="75000"/>
-              </a:schemeClr>
-            </a:solidFill>
-          </a:ln>
-        </p:spPr>
-        <p:style>
-          <a:lnRef idx="1">
-            <a:schemeClr val="accent1"/>
-          </a:lnRef>
-          <a:fillRef idx="0">
-            <a:schemeClr val="accent1"/>
-          </a:fillRef>
-          <a:effectRef idx="0">
-            <a:schemeClr val="accent1"/>
-          </a:effectRef>
-          <a:fontRef idx="minor">
-            <a:schemeClr val="tx1"/>
-          </a:fontRef>
-        </p:style>
-      </p:cxnSp>
-      <p:cxnSp>
-        <p:nvCxnSpPr>
-          <p:cNvPr id="34" name="Gerader Verbinder 33">
-            <a:extLst>
-              <a:ext uri="{FF2B5EF4-FFF2-40B4-BE49-F238E27FC236}">
-                <a16:creationId xmlns:a16="http://schemas.microsoft.com/office/drawing/2014/main" id="{B3AFAC6F-7051-4FC6-BFDD-879DB6BFEC3B}"/>
-              </a:ext>
-            </a:extLst>
-          </p:cNvPr>
-          <p:cNvCxnSpPr>
-            <a:cxnSpLocks/>
-            <a:stCxn id="23" idx="0"/>
-            <a:endCxn id="23" idx="3"/>
-          </p:cNvCxnSpPr>
-          <p:nvPr/>
-        </p:nvCxnSpPr>
-        <p:spPr>
-          <a:xfrm>
-            <a:off x="7412330" y="3037856"/>
-            <a:ext cx="382262" cy="382262"/>
-          </a:xfrm>
-          <a:prstGeom prst="line">
-            <a:avLst/>
-          </a:prstGeom>
-          <a:ln w="9525">
-            <a:solidFill>
-              <a:schemeClr val="accent1">
-                <a:lumMod val="75000"/>
-              </a:schemeClr>
-            </a:solidFill>
-          </a:ln>
-        </p:spPr>
-        <p:style>
-          <a:lnRef idx="1">
-            <a:schemeClr val="accent1"/>
-          </a:lnRef>
-          <a:fillRef idx="0">
-            <a:schemeClr val="accent1"/>
-          </a:fillRef>
-          <a:effectRef idx="0">
-            <a:schemeClr val="accent1"/>
-          </a:effectRef>
-          <a:fontRef idx="minor">
-            <a:schemeClr val="tx1"/>
-          </a:fontRef>
-        </p:style>
-      </p:cxnSp>
-      <p:cxnSp>
-        <p:nvCxnSpPr>
-          <p:cNvPr id="37" name="Gerader Verbinder 36">
-            <a:extLst>
-              <a:ext uri="{FF2B5EF4-FFF2-40B4-BE49-F238E27FC236}">
-                <a16:creationId xmlns:a16="http://schemas.microsoft.com/office/drawing/2014/main" id="{6F16C1DD-525D-42F1-9A5C-380C87E7C92F}"/>
-              </a:ext>
-            </a:extLst>
-          </p:cNvPr>
-          <p:cNvCxnSpPr>
-            <a:cxnSpLocks/>
-            <a:stCxn id="23" idx="2"/>
-            <a:endCxn id="23" idx="3"/>
-          </p:cNvCxnSpPr>
-          <p:nvPr/>
-        </p:nvCxnSpPr>
-        <p:spPr>
-          <a:xfrm flipV="1">
-            <a:off x="7412330" y="3420118"/>
-            <a:ext cx="382262" cy="382262"/>
-          </a:xfrm>
-          <a:prstGeom prst="line">
-            <a:avLst/>
-          </a:prstGeom>
-          <a:ln w="9525">
-            <a:solidFill>
-              <a:schemeClr val="accent1">
-                <a:lumMod val="75000"/>
-              </a:schemeClr>
-            </a:solidFill>
-          </a:ln>
-        </p:spPr>
-        <p:style>
-          <a:lnRef idx="1">
-            <a:schemeClr val="accent1"/>
-          </a:lnRef>
-          <a:fillRef idx="0">
-            <a:schemeClr val="accent1"/>
-          </a:fillRef>
-          <a:effectRef idx="0">
-            <a:schemeClr val="accent1"/>
-          </a:effectRef>
-          <a:fontRef idx="minor">
-            <a:schemeClr val="tx1"/>
-          </a:fontRef>
-        </p:style>
-      </p:cxnSp>
-      <p:sp>
-        <p:nvSpPr>
-          <p:cNvPr id="43" name="Ellipse 42">
-            <a:extLst>
-              <a:ext uri="{FF2B5EF4-FFF2-40B4-BE49-F238E27FC236}">
-                <a16:creationId xmlns:a16="http://schemas.microsoft.com/office/drawing/2014/main" id="{04E37C9B-BE7F-4452-A256-8E2A62C713F3}"/>
-              </a:ext>
-            </a:extLst>
-          </p:cNvPr>
-          <p:cNvSpPr/>
-          <p:nvPr/>
-        </p:nvSpPr>
-        <p:spPr>
-          <a:xfrm>
-            <a:off x="7003763" y="2033866"/>
-            <a:ext cx="280608" cy="236220"/>
-          </a:xfrm>
-          <a:prstGeom prst="ellipse">
-            <a:avLst/>
-          </a:prstGeom>
-          <a:solidFill>
-            <a:schemeClr val="bg1"/>
-          </a:solidFill>
-        </p:spPr>
-        <p:style>
-          <a:lnRef idx="2">
-            <a:schemeClr val="accent1">
-              <a:shade val="50000"/>
-            </a:schemeClr>
-          </a:lnRef>
-          <a:fillRef idx="1">
-            <a:schemeClr val="accent1"/>
-          </a:fillRef>
-          <a:effectRef idx="0">
-            <a:schemeClr val="accent1"/>
-          </a:effectRef>
-          <a:fontRef idx="minor">
-            <a:schemeClr val="lt1"/>
-          </a:fontRef>
-        </p:style>
-        <p:txBody>
-          <a:bodyPr rtlCol="0" anchor="ctr"/>
-          <a:lstStyle/>
-          <a:p>
-            <a:pPr algn="ctr"/>
-            <a:endParaRPr lang="de-DE"/>
-          </a:p>
-        </p:txBody>
-      </p:sp>
-      <p:sp>
-        <p:nvSpPr>
-          <p:cNvPr id="44" name="Pfeil: nach unten 43">
-            <a:extLst>
-              <a:ext uri="{FF2B5EF4-FFF2-40B4-BE49-F238E27FC236}">
-                <a16:creationId xmlns:a16="http://schemas.microsoft.com/office/drawing/2014/main" id="{2F27B121-BD89-409C-970E-D0D1FBD35258}"/>
-              </a:ext>
-            </a:extLst>
-          </p:cNvPr>
-          <p:cNvSpPr/>
-          <p:nvPr/>
-        </p:nvSpPr>
-        <p:spPr>
-          <a:xfrm>
-            <a:off x="7227126" y="2126752"/>
-            <a:ext cx="235442" cy="123053"/>
-          </a:xfrm>
-          <a:prstGeom prst="downArrow">
-            <a:avLst/>
-          </a:prstGeom>
-          <a:solidFill>
-            <a:schemeClr val="tx2">
-              <a:lumMod val="60000"/>
-              <a:lumOff val="40000"/>
-            </a:schemeClr>
-          </a:solidFill>
-          <a:ln>
+            <a:ln>
+              <a:solidFill>
+                <a:schemeClr val="accent1">
+                  <a:lumMod val="75000"/>
+                </a:schemeClr>
+              </a:solidFill>
+            </a:ln>
+          </p:spPr>
+          <p:style>
+            <a:lnRef idx="2">
+              <a:schemeClr val="accent6"/>
+            </a:lnRef>
+            <a:fillRef idx="1">
+              <a:schemeClr val="lt1"/>
+            </a:fillRef>
+            <a:effectRef idx="0">
+              <a:schemeClr val="accent6"/>
+            </a:effectRef>
+            <a:fontRef idx="minor">
+              <a:schemeClr val="dk1"/>
+            </a:fontRef>
+          </p:style>
+          <p:txBody>
+            <a:bodyPr rtlCol="0" anchor="ctr"/>
+            <a:lstStyle/>
+            <a:p>
+              <a:pPr algn="ctr"/>
+              <a:endParaRPr lang="de-DE" dirty="0">
+                <a:ln>
+                  <a:solidFill>
+                    <a:schemeClr val="accent1">
+                      <a:lumMod val="75000"/>
+                    </a:schemeClr>
+                  </a:solidFill>
+                </a:ln>
+                <a:solidFill>
+                  <a:schemeClr val="tx2">
+                    <a:lumMod val="60000"/>
+                    <a:lumOff val="40000"/>
+                  </a:schemeClr>
+                </a:solidFill>
+              </a:endParaRPr>
+            </a:p>
+          </p:txBody>
+        </p:sp>
+        <p:sp>
+          <p:nvSpPr>
+            <p:cNvPr id="91" name="Textfeld 90">
+              <a:extLst>
+                <a:ext uri="{FF2B5EF4-FFF2-40B4-BE49-F238E27FC236}">
+                  <a16:creationId xmlns:a16="http://schemas.microsoft.com/office/drawing/2014/main" id="{B885834E-900E-464C-8FFD-38DACED4FC0F}"/>
+                </a:ext>
+              </a:extLst>
+            </p:cNvPr>
+            <p:cNvSpPr txBox="1"/>
+            <p:nvPr/>
+          </p:nvSpPr>
+          <p:spPr>
+            <a:xfrm>
+              <a:off x="4081194" y="1060493"/>
+              <a:ext cx="2230254" cy="307777"/>
+            </a:xfrm>
+            <a:prstGeom prst="rect">
+              <a:avLst/>
+            </a:prstGeom>
+            <a:noFill/>
+          </p:spPr>
+          <p:txBody>
+            <a:bodyPr wrap="square" rtlCol="0">
+              <a:spAutoFit/>
+            </a:bodyPr>
+            <a:lstStyle/>
+            <a:p>
+              <a:pPr algn="ctr"/>
+              <a:r>
+                <a:rPr lang="de-DE" sz="1400" dirty="0">
+                  <a:solidFill>
+                    <a:schemeClr val="bg1"/>
+                  </a:solidFill>
+                </a:rPr>
+                <a:t>Produktverbesserungen</a:t>
+              </a:r>
+            </a:p>
+          </p:txBody>
+        </p:sp>
+        <p:sp>
+          <p:nvSpPr>
+            <p:cNvPr id="92" name="Pfeil: nach unten 91">
+              <a:extLst>
+                <a:ext uri="{FF2B5EF4-FFF2-40B4-BE49-F238E27FC236}">
+                  <a16:creationId xmlns:a16="http://schemas.microsoft.com/office/drawing/2014/main" id="{630D22FF-804F-48B6-A2CE-7D271A097A03}"/>
+                </a:ext>
+              </a:extLst>
+            </p:cNvPr>
+            <p:cNvSpPr/>
+            <p:nvPr/>
+          </p:nvSpPr>
+          <p:spPr>
+            <a:xfrm>
+              <a:off x="2753323" y="1755426"/>
+              <a:ext cx="469721" cy="722998"/>
+            </a:xfrm>
+            <a:prstGeom prst="downArrow">
+              <a:avLst/>
+            </a:prstGeom>
             <a:solidFill>
               <a:schemeClr val="tx2">
                 <a:lumMod val="60000"/>
                 <a:lumOff val="40000"/>
               </a:schemeClr>
             </a:solidFill>
-          </a:ln>
-        </p:spPr>
-        <p:style>
-          <a:lnRef idx="2">
-            <a:schemeClr val="accent1">
-              <a:shade val="50000"/>
-            </a:schemeClr>
-          </a:lnRef>
-          <a:fillRef idx="1">
-            <a:schemeClr val="accent1"/>
-          </a:fillRef>
-          <a:effectRef idx="0">
-            <a:schemeClr val="accent1"/>
-          </a:effectRef>
-          <a:fontRef idx="minor">
-            <a:schemeClr val="lt1"/>
-          </a:fontRef>
-        </p:style>
-        <p:txBody>
-          <a:bodyPr rtlCol="0" anchor="ctr"/>
-          <a:lstStyle/>
-          <a:p>
-            <a:pPr algn="ctr"/>
-            <a:endParaRPr lang="de-DE"/>
-          </a:p>
-        </p:txBody>
-      </p:sp>
-      <p:cxnSp>
-        <p:nvCxnSpPr>
-          <p:cNvPr id="45" name="Gerader Verbinder 44">
-            <a:extLst>
-              <a:ext uri="{FF2B5EF4-FFF2-40B4-BE49-F238E27FC236}">
-                <a16:creationId xmlns:a16="http://schemas.microsoft.com/office/drawing/2014/main" id="{9147ECAB-6466-4738-AE10-C38F85F960F7}"/>
-              </a:ext>
-            </a:extLst>
-          </p:cNvPr>
-          <p:cNvCxnSpPr>
-            <a:cxnSpLocks/>
-            <a:stCxn id="44" idx="3"/>
-            <a:endCxn id="44" idx="2"/>
-          </p:cNvCxnSpPr>
-          <p:nvPr/>
-        </p:nvCxnSpPr>
-        <p:spPr>
-          <a:xfrm flipH="1">
-            <a:off x="7344847" y="2188279"/>
-            <a:ext cx="117721" cy="61526"/>
-          </a:xfrm>
-          <a:prstGeom prst="line">
-            <a:avLst/>
-          </a:prstGeom>
-          <a:ln w="12700">
-            <a:solidFill>
+            <a:ln>
+              <a:solidFill>
+                <a:schemeClr val="accent1">
+                  <a:lumMod val="75000"/>
+                </a:schemeClr>
+              </a:solidFill>
+            </a:ln>
+          </p:spPr>
+          <p:style>
+            <a:lnRef idx="2">
               <a:schemeClr val="accent1">
-                <a:lumMod val="75000"/>
+                <a:shade val="50000"/>
               </a:schemeClr>
-            </a:solidFill>
-          </a:ln>
-        </p:spPr>
-        <p:style>
-          <a:lnRef idx="1">
-            <a:schemeClr val="accent1"/>
-          </a:lnRef>
-          <a:fillRef idx="0">
-            <a:schemeClr val="accent1"/>
-          </a:fillRef>
-          <a:effectRef idx="0">
-            <a:schemeClr val="accent1"/>
-          </a:effectRef>
-          <a:fontRef idx="minor">
-            <a:schemeClr val="tx1"/>
-          </a:fontRef>
-        </p:style>
-      </p:cxnSp>
-      <p:cxnSp>
-        <p:nvCxnSpPr>
-          <p:cNvPr id="46" name="Gerader Verbinder 45">
-            <a:extLst>
-              <a:ext uri="{FF2B5EF4-FFF2-40B4-BE49-F238E27FC236}">
-                <a16:creationId xmlns:a16="http://schemas.microsoft.com/office/drawing/2014/main" id="{474371A1-3181-4B60-BE3C-E419EF7059E1}"/>
-              </a:ext>
-            </a:extLst>
-          </p:cNvPr>
-          <p:cNvCxnSpPr>
-            <a:cxnSpLocks/>
-          </p:cNvCxnSpPr>
-          <p:nvPr/>
-        </p:nvCxnSpPr>
-        <p:spPr>
-          <a:xfrm>
-            <a:off x="7280551" y="2116455"/>
-            <a:ext cx="0" cy="62595"/>
-          </a:xfrm>
-          <a:prstGeom prst="line">
-            <a:avLst/>
-          </a:prstGeom>
-          <a:ln w="12700">
-            <a:solidFill>
-              <a:schemeClr val="accent1">
-                <a:lumMod val="75000"/>
-              </a:schemeClr>
-            </a:solidFill>
-          </a:ln>
-        </p:spPr>
-        <p:style>
-          <a:lnRef idx="1">
-            <a:schemeClr val="accent1"/>
-          </a:lnRef>
-          <a:fillRef idx="0">
-            <a:schemeClr val="accent1"/>
-          </a:fillRef>
-          <a:effectRef idx="0">
-            <a:schemeClr val="accent1"/>
-          </a:effectRef>
-          <a:fontRef idx="minor">
-            <a:schemeClr val="tx1"/>
-          </a:fontRef>
-        </p:style>
-      </p:cxnSp>
-      <p:cxnSp>
-        <p:nvCxnSpPr>
-          <p:cNvPr id="51" name="Gerader Verbinder 50">
-            <a:extLst>
-              <a:ext uri="{FF2B5EF4-FFF2-40B4-BE49-F238E27FC236}">
-                <a16:creationId xmlns:a16="http://schemas.microsoft.com/office/drawing/2014/main" id="{7BBC6EDD-E2C3-4DAA-A0C1-4BD4267EA974}"/>
-              </a:ext>
-            </a:extLst>
-          </p:cNvPr>
-          <p:cNvCxnSpPr>
-            <a:cxnSpLocks/>
-          </p:cNvCxnSpPr>
-          <p:nvPr/>
-        </p:nvCxnSpPr>
-        <p:spPr>
-          <a:xfrm>
-            <a:off x="7406630" y="2116455"/>
-            <a:ext cx="0" cy="62595"/>
-          </a:xfrm>
-          <a:prstGeom prst="line">
-            <a:avLst/>
-          </a:prstGeom>
-          <a:ln w="12700">
-            <a:solidFill>
-              <a:schemeClr val="accent1">
-                <a:lumMod val="75000"/>
-              </a:schemeClr>
-            </a:solidFill>
-          </a:ln>
-        </p:spPr>
-        <p:style>
-          <a:lnRef idx="1">
-            <a:schemeClr val="accent1"/>
-          </a:lnRef>
-          <a:fillRef idx="0">
-            <a:schemeClr val="accent1"/>
-          </a:fillRef>
-          <a:effectRef idx="0">
-            <a:schemeClr val="accent1"/>
-          </a:effectRef>
-          <a:fontRef idx="minor">
-            <a:schemeClr val="tx1"/>
-          </a:fontRef>
-        </p:style>
-      </p:cxnSp>
-      <p:cxnSp>
-        <p:nvCxnSpPr>
-          <p:cNvPr id="55" name="Gerader Verbinder 54">
-            <a:extLst>
-              <a:ext uri="{FF2B5EF4-FFF2-40B4-BE49-F238E27FC236}">
-                <a16:creationId xmlns:a16="http://schemas.microsoft.com/office/drawing/2014/main" id="{0ACA2074-2136-4B8E-AFC7-AE4A76E5996C}"/>
-              </a:ext>
-            </a:extLst>
-          </p:cNvPr>
-          <p:cNvCxnSpPr>
-            <a:cxnSpLocks/>
-            <a:stCxn id="44" idx="2"/>
-            <a:endCxn id="44" idx="1"/>
-          </p:cNvCxnSpPr>
-          <p:nvPr/>
-        </p:nvCxnSpPr>
-        <p:spPr>
-          <a:xfrm flipH="1" flipV="1">
-            <a:off x="7227126" y="2188279"/>
-            <a:ext cx="117721" cy="61526"/>
-          </a:xfrm>
-          <a:prstGeom prst="line">
-            <a:avLst/>
-          </a:prstGeom>
-          <a:ln w="12700">
-            <a:solidFill>
-              <a:schemeClr val="accent1">
-                <a:lumMod val="75000"/>
-              </a:schemeClr>
-            </a:solidFill>
-          </a:ln>
-        </p:spPr>
-        <p:style>
-          <a:lnRef idx="1">
-            <a:schemeClr val="accent1"/>
-          </a:lnRef>
-          <a:fillRef idx="0">
-            <a:schemeClr val="accent1"/>
-          </a:fillRef>
-          <a:effectRef idx="0">
-            <a:schemeClr val="accent1"/>
-          </a:effectRef>
-          <a:fontRef idx="minor">
-            <a:schemeClr val="tx1"/>
-          </a:fontRef>
-        </p:style>
-      </p:cxnSp>
-      <p:cxnSp>
-        <p:nvCxnSpPr>
-          <p:cNvPr id="61" name="Gerader Verbinder 60">
-            <a:extLst>
-              <a:ext uri="{FF2B5EF4-FFF2-40B4-BE49-F238E27FC236}">
-                <a16:creationId xmlns:a16="http://schemas.microsoft.com/office/drawing/2014/main" id="{5C7F3251-98BB-4B74-B166-970399FC3A7D}"/>
-              </a:ext>
-            </a:extLst>
-          </p:cNvPr>
-          <p:cNvCxnSpPr>
-            <a:cxnSpLocks/>
-          </p:cNvCxnSpPr>
-          <p:nvPr/>
-        </p:nvCxnSpPr>
-        <p:spPr>
-          <a:xfrm>
-            <a:off x="7401997" y="2182862"/>
-            <a:ext cx="75460" cy="0"/>
-          </a:xfrm>
-          <a:prstGeom prst="line">
-            <a:avLst/>
-          </a:prstGeom>
-          <a:ln w="12700">
-            <a:solidFill>
-              <a:schemeClr val="accent1">
-                <a:lumMod val="75000"/>
-              </a:schemeClr>
-            </a:solidFill>
-          </a:ln>
-        </p:spPr>
-        <p:style>
-          <a:lnRef idx="1">
-            <a:schemeClr val="accent1"/>
-          </a:lnRef>
-          <a:fillRef idx="0">
-            <a:schemeClr val="accent1"/>
-          </a:fillRef>
-          <a:effectRef idx="0">
-            <a:schemeClr val="accent1"/>
-          </a:effectRef>
-          <a:fontRef idx="minor">
-            <a:schemeClr val="tx1"/>
-          </a:fontRef>
-        </p:style>
-      </p:cxnSp>
-      <p:cxnSp>
-        <p:nvCxnSpPr>
-          <p:cNvPr id="65" name="Gerader Verbinder 64">
-            <a:extLst>
-              <a:ext uri="{FF2B5EF4-FFF2-40B4-BE49-F238E27FC236}">
-                <a16:creationId xmlns:a16="http://schemas.microsoft.com/office/drawing/2014/main" id="{DD1FB7AA-E238-4DAD-9B80-FC7697AC832F}"/>
-              </a:ext>
-            </a:extLst>
-          </p:cNvPr>
-          <p:cNvCxnSpPr>
-            <a:cxnSpLocks/>
-          </p:cNvCxnSpPr>
-          <p:nvPr/>
-        </p:nvCxnSpPr>
-        <p:spPr>
-          <a:xfrm>
-            <a:off x="7208057" y="2182862"/>
-            <a:ext cx="75460" cy="0"/>
-          </a:xfrm>
-          <a:prstGeom prst="line">
-            <a:avLst/>
-          </a:prstGeom>
-          <a:ln w="12700">
-            <a:solidFill>
-              <a:schemeClr val="accent1">
-                <a:lumMod val="75000"/>
-              </a:schemeClr>
-            </a:solidFill>
-          </a:ln>
-        </p:spPr>
-        <p:style>
-          <a:lnRef idx="1">
-            <a:schemeClr val="accent1"/>
-          </a:lnRef>
-          <a:fillRef idx="0">
-            <a:schemeClr val="accent1"/>
-          </a:fillRef>
-          <a:effectRef idx="0">
-            <a:schemeClr val="accent1"/>
-          </a:effectRef>
-          <a:fontRef idx="minor">
-            <a:schemeClr val="tx1"/>
-          </a:fontRef>
-        </p:style>
-      </p:cxnSp>
+            </a:lnRef>
+            <a:fillRef idx="1">
+              <a:schemeClr val="accent1"/>
+            </a:fillRef>
+            <a:effectRef idx="0">
+              <a:schemeClr val="accent1"/>
+            </a:effectRef>
+            <a:fontRef idx="minor">
+              <a:schemeClr val="lt1"/>
+            </a:fontRef>
+          </p:style>
+          <p:txBody>
+            <a:bodyPr rtlCol="0" anchor="ctr"/>
+            <a:lstStyle/>
+            <a:p>
+              <a:pPr algn="ctr"/>
+              <a:endParaRPr lang="de-DE"/>
+            </a:p>
+          </p:txBody>
+        </p:sp>
+      </p:grpSp>
     </p:spTree>
     <p:extLst>
       <p:ext uri="{BB962C8B-B14F-4D97-AF65-F5344CB8AC3E}">

</xml_diff>